<commit_message>
Criando Footer e o Banner
</commit_message>
<xml_diff>
--- a/imgs/ppt.pptx
+++ b/imgs/ppt.pptx
@@ -2,7 +2,7 @@
 <file path=ppt/presentation.xml><?xml version="1.0" encoding="utf-8"?>
 <p:presentation xmlns:a="http://schemas.openxmlformats.org/drawingml/2006/main" xmlns:r="http://schemas.openxmlformats.org/officeDocument/2006/relationships" xmlns:p="http://schemas.openxmlformats.org/presentationml/2006/main" saveSubsetFonts="1">
   <p:sldMasterIdLst>
-    <p:sldMasterId id="2147483648" r:id="rId1"/>
+    <p:sldMasterId id="2147483660" r:id="rId1"/>
   </p:sldMasterIdLst>
   <p:sldIdLst>
     <p:sldId id="256" r:id="rId2"/>
@@ -15,8 +15,11 @@
     <p:sldId id="264" r:id="rId9"/>
     <p:sldId id="265" r:id="rId10"/>
     <p:sldId id="266" r:id="rId11"/>
+    <p:sldId id="269" r:id="rId12"/>
+    <p:sldId id="267" r:id="rId13"/>
+    <p:sldId id="268" r:id="rId14"/>
   </p:sldIdLst>
-  <p:sldSz cx="12192000" cy="6858000"/>
+  <p:sldSz cx="12192000" cy="3509963"/>
   <p:notesSz cx="6858000" cy="9144000"/>
   <p:defaultTextStyle>
     <a:defPPr>
@@ -116,7 +119,7 @@
   <p:extLst>
     <p:ext uri="{EFAFB233-063F-42B5-8137-9DF3F51BA10A}">
       <p15:sldGuideLst xmlns:p15="http://schemas.microsoft.com/office/powerpoint/2012/main">
-        <p15:guide id="1" orient="horz" pos="2137" userDrawn="1">
+        <p15:guide id="1" orient="horz" pos="1094" userDrawn="1">
           <p15:clr>
             <a:srgbClr val="A4A3A4"/>
           </p15:clr>
@@ -151,7 +154,7 @@
       </p:grpSpPr>
       <p:sp>
         <p:nvSpPr>
-          <p:cNvPr id="2" name="Título 1"/>
+          <p:cNvPr id="2" name="Title 1"/>
           <p:cNvSpPr>
             <a:spLocks noGrp="1"/>
           </p:cNvSpPr>
@@ -161,15 +164,15 @@
         </p:nvSpPr>
         <p:spPr>
           <a:xfrm>
-            <a:off x="1524000" y="1122363"/>
-            <a:ext cx="9144000" cy="2387600"/>
+            <a:off x="1524000" y="574432"/>
+            <a:ext cx="9144000" cy="1221987"/>
           </a:xfrm>
         </p:spPr>
         <p:txBody>
           <a:bodyPr anchor="b"/>
           <a:lstStyle>
             <a:lvl1pPr algn="ctr">
-              <a:defRPr sz="6000"/>
+              <a:defRPr sz="3071"/>
             </a:lvl1pPr>
           </a:lstStyle>
           <a:p>
@@ -177,13 +180,13 @@
               <a:rPr lang="pt-BR" smtClean="0"/>
               <a:t>Clique para editar o título mestre</a:t>
             </a:r>
-            <a:endParaRPr lang="pt-BR"/>
-          </a:p>
-        </p:txBody>
-      </p:sp>
-      <p:sp>
-        <p:nvSpPr>
-          <p:cNvPr id="3" name="Subtítulo 2"/>
+            <a:endParaRPr lang="en-US" dirty="0"/>
+          </a:p>
+        </p:txBody>
+      </p:sp>
+      <p:sp>
+        <p:nvSpPr>
+          <p:cNvPr id="3" name="Subtitle 2"/>
           <p:cNvSpPr>
             <a:spLocks noGrp="1"/>
           </p:cNvSpPr>
@@ -193,8 +196,8 @@
         </p:nvSpPr>
         <p:spPr>
           <a:xfrm>
-            <a:off x="1524000" y="3602038"/>
-            <a:ext cx="9144000" cy="1655762"/>
+            <a:off x="1524000" y="1843543"/>
+            <a:ext cx="9144000" cy="847428"/>
           </a:xfrm>
         </p:spPr>
         <p:txBody>
@@ -202,39 +205,39 @@
           <a:lstStyle>
             <a:lvl1pPr marL="0" indent="0" algn="ctr">
               <a:buNone/>
-              <a:defRPr sz="2400"/>
+              <a:defRPr sz="1228"/>
             </a:lvl1pPr>
-            <a:lvl2pPr marL="457200" indent="0" algn="ctr">
+            <a:lvl2pPr marL="233995" indent="0" algn="ctr">
               <a:buNone/>
-              <a:defRPr sz="2000"/>
+              <a:defRPr sz="1024"/>
             </a:lvl2pPr>
-            <a:lvl3pPr marL="914400" indent="0" algn="ctr">
+            <a:lvl3pPr marL="467990" indent="0" algn="ctr">
               <a:buNone/>
-              <a:defRPr sz="1800"/>
+              <a:defRPr sz="921"/>
             </a:lvl3pPr>
-            <a:lvl4pPr marL="1371600" indent="0" algn="ctr">
+            <a:lvl4pPr marL="701985" indent="0" algn="ctr">
               <a:buNone/>
-              <a:defRPr sz="1600"/>
+              <a:defRPr sz="819"/>
             </a:lvl4pPr>
-            <a:lvl5pPr marL="1828800" indent="0" algn="ctr">
+            <a:lvl5pPr marL="935980" indent="0" algn="ctr">
               <a:buNone/>
-              <a:defRPr sz="1600"/>
+              <a:defRPr sz="819"/>
             </a:lvl5pPr>
-            <a:lvl6pPr marL="2286000" indent="0" algn="ctr">
+            <a:lvl6pPr marL="1169975" indent="0" algn="ctr">
               <a:buNone/>
-              <a:defRPr sz="1600"/>
+              <a:defRPr sz="819"/>
             </a:lvl6pPr>
-            <a:lvl7pPr marL="2743200" indent="0" algn="ctr">
+            <a:lvl7pPr marL="1403970" indent="0" algn="ctr">
               <a:buNone/>
-              <a:defRPr sz="1600"/>
+              <a:defRPr sz="819"/>
             </a:lvl7pPr>
-            <a:lvl8pPr marL="3200400" indent="0" algn="ctr">
+            <a:lvl8pPr marL="1637965" indent="0" algn="ctr">
               <a:buNone/>
-              <a:defRPr sz="1600"/>
+              <a:defRPr sz="819"/>
             </a:lvl8pPr>
-            <a:lvl9pPr marL="3657600" indent="0" algn="ctr">
+            <a:lvl9pPr marL="1871960" indent="0" algn="ctr">
               <a:buNone/>
-              <a:defRPr sz="1600"/>
+              <a:defRPr sz="819"/>
             </a:lvl9pPr>
           </a:lstStyle>
           <a:p>
@@ -242,13 +245,13 @@
               <a:rPr lang="pt-BR" smtClean="0"/>
               <a:t>Clique para editar o estilo do subtítulo mestre</a:t>
             </a:r>
-            <a:endParaRPr lang="pt-BR"/>
-          </a:p>
-        </p:txBody>
-      </p:sp>
-      <p:sp>
-        <p:nvSpPr>
-          <p:cNvPr id="4" name="Espaço Reservado para Data 3"/>
+            <a:endParaRPr lang="en-US" dirty="0"/>
+          </a:p>
+        </p:txBody>
+      </p:sp>
+      <p:sp>
+        <p:nvSpPr>
+          <p:cNvPr id="4" name="Date Placeholder 3"/>
           <p:cNvSpPr>
             <a:spLocks noGrp="1"/>
           </p:cNvSpPr>
@@ -263,7 +266,7 @@
           <a:p>
             <a:fld id="{0B5757C9-29C2-4B15-96BC-892616DC4387}" type="datetimeFigureOut">
               <a:rPr lang="pt-BR" smtClean="0"/>
-              <a:t>04/05/2022</a:t>
+              <a:t>08/05/2022</a:t>
             </a:fld>
             <a:endParaRPr lang="pt-BR"/>
           </a:p>
@@ -271,7 +274,7 @@
       </p:sp>
       <p:sp>
         <p:nvSpPr>
-          <p:cNvPr id="5" name="Espaço Reservado para Rodapé 4"/>
+          <p:cNvPr id="5" name="Footer Placeholder 4"/>
           <p:cNvSpPr>
             <a:spLocks noGrp="1"/>
           </p:cNvSpPr>
@@ -290,7 +293,7 @@
       </p:sp>
       <p:sp>
         <p:nvSpPr>
-          <p:cNvPr id="6" name="Espaço Reservado para Número de Slide 5"/>
+          <p:cNvPr id="6" name="Slide Number Placeholder 5"/>
           <p:cNvSpPr>
             <a:spLocks noGrp="1"/>
           </p:cNvSpPr>
@@ -314,7 +317,7 @@
     </p:spTree>
     <p:extLst>
       <p:ext uri="{BB962C8B-B14F-4D97-AF65-F5344CB8AC3E}">
-        <p14:creationId xmlns:p14="http://schemas.microsoft.com/office/powerpoint/2010/main" val="1429517551"/>
+        <p14:creationId xmlns:p14="http://schemas.microsoft.com/office/powerpoint/2010/main" val="3786500540"/>
       </p:ext>
     </p:extLst>
   </p:cSld>
@@ -343,7 +346,7 @@
       </p:grpSpPr>
       <p:sp>
         <p:nvSpPr>
-          <p:cNvPr id="2" name="Título 1"/>
+          <p:cNvPr id="2" name="Title 1"/>
           <p:cNvSpPr>
             <a:spLocks noGrp="1"/>
           </p:cNvSpPr>
@@ -360,13 +363,13 @@
               <a:rPr lang="pt-BR" smtClean="0"/>
               <a:t>Clique para editar o título mestre</a:t>
             </a:r>
-            <a:endParaRPr lang="pt-BR"/>
-          </a:p>
-        </p:txBody>
-      </p:sp>
-      <p:sp>
-        <p:nvSpPr>
-          <p:cNvPr id="3" name="Espaço Reservado para Texto Vertical 2"/>
+            <a:endParaRPr lang="en-US" dirty="0"/>
+          </a:p>
+        </p:txBody>
+      </p:sp>
+      <p:sp>
+        <p:nvSpPr>
+          <p:cNvPr id="3" name="Vertical Text Placeholder 2"/>
           <p:cNvSpPr>
             <a:spLocks noGrp="1"/>
           </p:cNvSpPr>
@@ -412,13 +415,13 @@
               <a:rPr lang="pt-BR" smtClean="0"/>
               <a:t>Quinto nível</a:t>
             </a:r>
-            <a:endParaRPr lang="pt-BR"/>
-          </a:p>
-        </p:txBody>
-      </p:sp>
-      <p:sp>
-        <p:nvSpPr>
-          <p:cNvPr id="4" name="Espaço Reservado para Data 3"/>
+            <a:endParaRPr lang="en-US" dirty="0"/>
+          </a:p>
+        </p:txBody>
+      </p:sp>
+      <p:sp>
+        <p:nvSpPr>
+          <p:cNvPr id="4" name="Date Placeholder 3"/>
           <p:cNvSpPr>
             <a:spLocks noGrp="1"/>
           </p:cNvSpPr>
@@ -433,7 +436,7 @@
           <a:p>
             <a:fld id="{0B5757C9-29C2-4B15-96BC-892616DC4387}" type="datetimeFigureOut">
               <a:rPr lang="pt-BR" smtClean="0"/>
-              <a:t>04/05/2022</a:t>
+              <a:t>08/05/2022</a:t>
             </a:fld>
             <a:endParaRPr lang="pt-BR"/>
           </a:p>
@@ -441,7 +444,7 @@
       </p:sp>
       <p:sp>
         <p:nvSpPr>
-          <p:cNvPr id="5" name="Espaço Reservado para Rodapé 4"/>
+          <p:cNvPr id="5" name="Footer Placeholder 4"/>
           <p:cNvSpPr>
             <a:spLocks noGrp="1"/>
           </p:cNvSpPr>
@@ -460,7 +463,7 @@
       </p:sp>
       <p:sp>
         <p:nvSpPr>
-          <p:cNvPr id="6" name="Espaço Reservado para Número de Slide 5"/>
+          <p:cNvPr id="6" name="Slide Number Placeholder 5"/>
           <p:cNvSpPr>
             <a:spLocks noGrp="1"/>
           </p:cNvSpPr>
@@ -484,7 +487,7 @@
     </p:spTree>
     <p:extLst>
       <p:ext uri="{BB962C8B-B14F-4D97-AF65-F5344CB8AC3E}">
-        <p14:creationId xmlns:p14="http://schemas.microsoft.com/office/powerpoint/2010/main" val="593706441"/>
+        <p14:creationId xmlns:p14="http://schemas.microsoft.com/office/powerpoint/2010/main" val="154917610"/>
       </p:ext>
     </p:extLst>
   </p:cSld>
@@ -513,7 +516,7 @@
       </p:grpSpPr>
       <p:sp>
         <p:nvSpPr>
-          <p:cNvPr id="2" name="Título Vertical 1"/>
+          <p:cNvPr id="2" name="Vertical Title 1"/>
           <p:cNvSpPr>
             <a:spLocks noGrp="1"/>
           </p:cNvSpPr>
@@ -523,8 +526,8 @@
         </p:nvSpPr>
         <p:spPr>
           <a:xfrm>
-            <a:off x="8724900" y="365125"/>
-            <a:ext cx="2628900" cy="5811838"/>
+            <a:off x="8724900" y="186873"/>
+            <a:ext cx="2628900" cy="2974531"/>
           </a:xfrm>
         </p:spPr>
         <p:txBody>
@@ -535,13 +538,13 @@
               <a:rPr lang="pt-BR" smtClean="0"/>
               <a:t>Clique para editar o título mestre</a:t>
             </a:r>
-            <a:endParaRPr lang="pt-BR"/>
-          </a:p>
-        </p:txBody>
-      </p:sp>
-      <p:sp>
-        <p:nvSpPr>
-          <p:cNvPr id="3" name="Espaço Reservado para Texto Vertical 2"/>
+            <a:endParaRPr lang="en-US" dirty="0"/>
+          </a:p>
+        </p:txBody>
+      </p:sp>
+      <p:sp>
+        <p:nvSpPr>
+          <p:cNvPr id="3" name="Vertical Text Placeholder 2"/>
           <p:cNvSpPr>
             <a:spLocks noGrp="1"/>
           </p:cNvSpPr>
@@ -551,8 +554,8 @@
         </p:nvSpPr>
         <p:spPr>
           <a:xfrm>
-            <a:off x="838200" y="365125"/>
-            <a:ext cx="7734300" cy="5811838"/>
+            <a:off x="838200" y="186873"/>
+            <a:ext cx="7734300" cy="2974531"/>
           </a:xfrm>
         </p:spPr>
         <p:txBody>
@@ -592,13 +595,13 @@
               <a:rPr lang="pt-BR" smtClean="0"/>
               <a:t>Quinto nível</a:t>
             </a:r>
-            <a:endParaRPr lang="pt-BR"/>
-          </a:p>
-        </p:txBody>
-      </p:sp>
-      <p:sp>
-        <p:nvSpPr>
-          <p:cNvPr id="4" name="Espaço Reservado para Data 3"/>
+            <a:endParaRPr lang="en-US" dirty="0"/>
+          </a:p>
+        </p:txBody>
+      </p:sp>
+      <p:sp>
+        <p:nvSpPr>
+          <p:cNvPr id="4" name="Date Placeholder 3"/>
           <p:cNvSpPr>
             <a:spLocks noGrp="1"/>
           </p:cNvSpPr>
@@ -613,7 +616,7 @@
           <a:p>
             <a:fld id="{0B5757C9-29C2-4B15-96BC-892616DC4387}" type="datetimeFigureOut">
               <a:rPr lang="pt-BR" smtClean="0"/>
-              <a:t>04/05/2022</a:t>
+              <a:t>08/05/2022</a:t>
             </a:fld>
             <a:endParaRPr lang="pt-BR"/>
           </a:p>
@@ -621,7 +624,7 @@
       </p:sp>
       <p:sp>
         <p:nvSpPr>
-          <p:cNvPr id="5" name="Espaço Reservado para Rodapé 4"/>
+          <p:cNvPr id="5" name="Footer Placeholder 4"/>
           <p:cNvSpPr>
             <a:spLocks noGrp="1"/>
           </p:cNvSpPr>
@@ -640,7 +643,7 @@
       </p:sp>
       <p:sp>
         <p:nvSpPr>
-          <p:cNvPr id="6" name="Espaço Reservado para Número de Slide 5"/>
+          <p:cNvPr id="6" name="Slide Number Placeholder 5"/>
           <p:cNvSpPr>
             <a:spLocks noGrp="1"/>
           </p:cNvSpPr>
@@ -664,7 +667,7 @@
     </p:spTree>
     <p:extLst>
       <p:ext uri="{BB962C8B-B14F-4D97-AF65-F5344CB8AC3E}">
-        <p14:creationId xmlns:p14="http://schemas.microsoft.com/office/powerpoint/2010/main" val="2920064754"/>
+        <p14:creationId xmlns:p14="http://schemas.microsoft.com/office/powerpoint/2010/main" val="980670709"/>
       </p:ext>
     </p:extLst>
   </p:cSld>
@@ -693,7 +696,7 @@
       </p:grpSpPr>
       <p:sp>
         <p:nvSpPr>
-          <p:cNvPr id="2" name="Título 1"/>
+          <p:cNvPr id="2" name="Title 1"/>
           <p:cNvSpPr>
             <a:spLocks noGrp="1"/>
           </p:cNvSpPr>
@@ -710,13 +713,13 @@
               <a:rPr lang="pt-BR" smtClean="0"/>
               <a:t>Clique para editar o título mestre</a:t>
             </a:r>
-            <a:endParaRPr lang="pt-BR"/>
-          </a:p>
-        </p:txBody>
-      </p:sp>
-      <p:sp>
-        <p:nvSpPr>
-          <p:cNvPr id="3" name="Espaço Reservado para Conteúdo 2"/>
+            <a:endParaRPr lang="en-US" dirty="0"/>
+          </a:p>
+        </p:txBody>
+      </p:sp>
+      <p:sp>
+        <p:nvSpPr>
+          <p:cNvPr id="3" name="Content Placeholder 2"/>
           <p:cNvSpPr>
             <a:spLocks noGrp="1"/>
           </p:cNvSpPr>
@@ -762,13 +765,13 @@
               <a:rPr lang="pt-BR" smtClean="0"/>
               <a:t>Quinto nível</a:t>
             </a:r>
-            <a:endParaRPr lang="pt-BR"/>
-          </a:p>
-        </p:txBody>
-      </p:sp>
-      <p:sp>
-        <p:nvSpPr>
-          <p:cNvPr id="4" name="Espaço Reservado para Data 3"/>
+            <a:endParaRPr lang="en-US" dirty="0"/>
+          </a:p>
+        </p:txBody>
+      </p:sp>
+      <p:sp>
+        <p:nvSpPr>
+          <p:cNvPr id="4" name="Date Placeholder 3"/>
           <p:cNvSpPr>
             <a:spLocks noGrp="1"/>
           </p:cNvSpPr>
@@ -783,7 +786,7 @@
           <a:p>
             <a:fld id="{0B5757C9-29C2-4B15-96BC-892616DC4387}" type="datetimeFigureOut">
               <a:rPr lang="pt-BR" smtClean="0"/>
-              <a:t>04/05/2022</a:t>
+              <a:t>08/05/2022</a:t>
             </a:fld>
             <a:endParaRPr lang="pt-BR"/>
           </a:p>
@@ -791,7 +794,7 @@
       </p:sp>
       <p:sp>
         <p:nvSpPr>
-          <p:cNvPr id="5" name="Espaço Reservado para Rodapé 4"/>
+          <p:cNvPr id="5" name="Footer Placeholder 4"/>
           <p:cNvSpPr>
             <a:spLocks noGrp="1"/>
           </p:cNvSpPr>
@@ -810,7 +813,7 @@
       </p:sp>
       <p:sp>
         <p:nvSpPr>
-          <p:cNvPr id="6" name="Espaço Reservado para Número de Slide 5"/>
+          <p:cNvPr id="6" name="Slide Number Placeholder 5"/>
           <p:cNvSpPr>
             <a:spLocks noGrp="1"/>
           </p:cNvSpPr>
@@ -834,7 +837,7 @@
     </p:spTree>
     <p:extLst>
       <p:ext uri="{BB962C8B-B14F-4D97-AF65-F5344CB8AC3E}">
-        <p14:creationId xmlns:p14="http://schemas.microsoft.com/office/powerpoint/2010/main" val="2878982927"/>
+        <p14:creationId xmlns:p14="http://schemas.microsoft.com/office/powerpoint/2010/main" val="1298541106"/>
       </p:ext>
     </p:extLst>
   </p:cSld>
@@ -863,7 +866,7 @@
       </p:grpSpPr>
       <p:sp>
         <p:nvSpPr>
-          <p:cNvPr id="2" name="Título 1"/>
+          <p:cNvPr id="2" name="Title 1"/>
           <p:cNvSpPr>
             <a:spLocks noGrp="1"/>
           </p:cNvSpPr>
@@ -873,15 +876,15 @@
         </p:nvSpPr>
         <p:spPr>
           <a:xfrm>
-            <a:off x="831850" y="1709738"/>
-            <a:ext cx="10515600" cy="2852737"/>
+            <a:off x="831850" y="875054"/>
+            <a:ext cx="10515600" cy="1460047"/>
           </a:xfrm>
         </p:spPr>
         <p:txBody>
           <a:bodyPr anchor="b"/>
           <a:lstStyle>
             <a:lvl1pPr>
-              <a:defRPr sz="6000"/>
+              <a:defRPr sz="3071"/>
             </a:lvl1pPr>
           </a:lstStyle>
           <a:p>
@@ -889,13 +892,13 @@
               <a:rPr lang="pt-BR" smtClean="0"/>
               <a:t>Clique para editar o título mestre</a:t>
             </a:r>
-            <a:endParaRPr lang="pt-BR"/>
-          </a:p>
-        </p:txBody>
-      </p:sp>
-      <p:sp>
-        <p:nvSpPr>
-          <p:cNvPr id="3" name="Espaço Reservado para Texto 2"/>
+            <a:endParaRPr lang="en-US" dirty="0"/>
+          </a:p>
+        </p:txBody>
+      </p:sp>
+      <p:sp>
+        <p:nvSpPr>
+          <p:cNvPr id="3" name="Text Placeholder 2"/>
           <p:cNvSpPr>
             <a:spLocks noGrp="1"/>
           </p:cNvSpPr>
@@ -905,8 +908,8 @@
         </p:nvSpPr>
         <p:spPr>
           <a:xfrm>
-            <a:off x="831850" y="4589463"/>
-            <a:ext cx="10515600" cy="1500187"/>
+            <a:off x="831850" y="2348913"/>
+            <a:ext cx="10515600" cy="767804"/>
           </a:xfrm>
         </p:spPr>
         <p:txBody>
@@ -914,7 +917,7 @@
           <a:lstStyle>
             <a:lvl1pPr marL="0" indent="0">
               <a:buNone/>
-              <a:defRPr sz="2400">
+              <a:defRPr sz="1228">
                 <a:solidFill>
                   <a:schemeClr val="tx1">
                     <a:tint val="75000"/>
@@ -922,9 +925,9 @@
                 </a:solidFill>
               </a:defRPr>
             </a:lvl1pPr>
-            <a:lvl2pPr marL="457200" indent="0">
+            <a:lvl2pPr marL="233995" indent="0">
               <a:buNone/>
-              <a:defRPr sz="2000">
+              <a:defRPr sz="1024">
                 <a:solidFill>
                   <a:schemeClr val="tx1">
                     <a:tint val="75000"/>
@@ -932,9 +935,9 @@
                 </a:solidFill>
               </a:defRPr>
             </a:lvl2pPr>
-            <a:lvl3pPr marL="914400" indent="0">
+            <a:lvl3pPr marL="467990" indent="0">
               <a:buNone/>
-              <a:defRPr sz="1800">
+              <a:defRPr sz="921">
                 <a:solidFill>
                   <a:schemeClr val="tx1">
                     <a:tint val="75000"/>
@@ -942,9 +945,9 @@
                 </a:solidFill>
               </a:defRPr>
             </a:lvl3pPr>
-            <a:lvl4pPr marL="1371600" indent="0">
+            <a:lvl4pPr marL="701985" indent="0">
               <a:buNone/>
-              <a:defRPr sz="1600">
+              <a:defRPr sz="819">
                 <a:solidFill>
                   <a:schemeClr val="tx1">
                     <a:tint val="75000"/>
@@ -952,9 +955,9 @@
                 </a:solidFill>
               </a:defRPr>
             </a:lvl4pPr>
-            <a:lvl5pPr marL="1828800" indent="0">
+            <a:lvl5pPr marL="935980" indent="0">
               <a:buNone/>
-              <a:defRPr sz="1600">
+              <a:defRPr sz="819">
                 <a:solidFill>
                   <a:schemeClr val="tx1">
                     <a:tint val="75000"/>
@@ -962,9 +965,9 @@
                 </a:solidFill>
               </a:defRPr>
             </a:lvl5pPr>
-            <a:lvl6pPr marL="2286000" indent="0">
+            <a:lvl6pPr marL="1169975" indent="0">
               <a:buNone/>
-              <a:defRPr sz="1600">
+              <a:defRPr sz="819">
                 <a:solidFill>
                   <a:schemeClr val="tx1">
                     <a:tint val="75000"/>
@@ -972,9 +975,9 @@
                 </a:solidFill>
               </a:defRPr>
             </a:lvl6pPr>
-            <a:lvl7pPr marL="2743200" indent="0">
+            <a:lvl7pPr marL="1403970" indent="0">
               <a:buNone/>
-              <a:defRPr sz="1600">
+              <a:defRPr sz="819">
                 <a:solidFill>
                   <a:schemeClr val="tx1">
                     <a:tint val="75000"/>
@@ -982,9 +985,9 @@
                 </a:solidFill>
               </a:defRPr>
             </a:lvl7pPr>
-            <a:lvl8pPr marL="3200400" indent="0">
+            <a:lvl8pPr marL="1637965" indent="0">
               <a:buNone/>
-              <a:defRPr sz="1600">
+              <a:defRPr sz="819">
                 <a:solidFill>
                   <a:schemeClr val="tx1">
                     <a:tint val="75000"/>
@@ -992,9 +995,9 @@
                 </a:solidFill>
               </a:defRPr>
             </a:lvl8pPr>
-            <a:lvl9pPr marL="3657600" indent="0">
+            <a:lvl9pPr marL="1871960" indent="0">
               <a:buNone/>
-              <a:defRPr sz="1600">
+              <a:defRPr sz="819">
                 <a:solidFill>
                   <a:schemeClr val="tx1">
                     <a:tint val="75000"/>
@@ -1014,7 +1017,7 @@
       </p:sp>
       <p:sp>
         <p:nvSpPr>
-          <p:cNvPr id="4" name="Espaço Reservado para Data 3"/>
+          <p:cNvPr id="4" name="Date Placeholder 3"/>
           <p:cNvSpPr>
             <a:spLocks noGrp="1"/>
           </p:cNvSpPr>
@@ -1029,7 +1032,7 @@
           <a:p>
             <a:fld id="{0B5757C9-29C2-4B15-96BC-892616DC4387}" type="datetimeFigureOut">
               <a:rPr lang="pt-BR" smtClean="0"/>
-              <a:t>04/05/2022</a:t>
+              <a:t>08/05/2022</a:t>
             </a:fld>
             <a:endParaRPr lang="pt-BR"/>
           </a:p>
@@ -1037,7 +1040,7 @@
       </p:sp>
       <p:sp>
         <p:nvSpPr>
-          <p:cNvPr id="5" name="Espaço Reservado para Rodapé 4"/>
+          <p:cNvPr id="5" name="Footer Placeholder 4"/>
           <p:cNvSpPr>
             <a:spLocks noGrp="1"/>
           </p:cNvSpPr>
@@ -1056,7 +1059,7 @@
       </p:sp>
       <p:sp>
         <p:nvSpPr>
-          <p:cNvPr id="6" name="Espaço Reservado para Número de Slide 5"/>
+          <p:cNvPr id="6" name="Slide Number Placeholder 5"/>
           <p:cNvSpPr>
             <a:spLocks noGrp="1"/>
           </p:cNvSpPr>
@@ -1080,7 +1083,7 @@
     </p:spTree>
     <p:extLst>
       <p:ext uri="{BB962C8B-B14F-4D97-AF65-F5344CB8AC3E}">
-        <p14:creationId xmlns:p14="http://schemas.microsoft.com/office/powerpoint/2010/main" val="1044215326"/>
+        <p14:creationId xmlns:p14="http://schemas.microsoft.com/office/powerpoint/2010/main" val="565302941"/>
       </p:ext>
     </p:extLst>
   </p:cSld>
@@ -1109,7 +1112,7 @@
       </p:grpSpPr>
       <p:sp>
         <p:nvSpPr>
-          <p:cNvPr id="2" name="Título 1"/>
+          <p:cNvPr id="2" name="Title 1"/>
           <p:cNvSpPr>
             <a:spLocks noGrp="1"/>
           </p:cNvSpPr>
@@ -1126,13 +1129,13 @@
               <a:rPr lang="pt-BR" smtClean="0"/>
               <a:t>Clique para editar o título mestre</a:t>
             </a:r>
-            <a:endParaRPr lang="pt-BR"/>
-          </a:p>
-        </p:txBody>
-      </p:sp>
-      <p:sp>
-        <p:nvSpPr>
-          <p:cNvPr id="3" name="Espaço Reservado para Conteúdo 2"/>
+            <a:endParaRPr lang="en-US" dirty="0"/>
+          </a:p>
+        </p:txBody>
+      </p:sp>
+      <p:sp>
+        <p:nvSpPr>
+          <p:cNvPr id="3" name="Content Placeholder 2"/>
           <p:cNvSpPr>
             <a:spLocks noGrp="1"/>
           </p:cNvSpPr>
@@ -1142,8 +1145,8 @@
         </p:nvSpPr>
         <p:spPr>
           <a:xfrm>
-            <a:off x="838200" y="1825625"/>
-            <a:ext cx="5181600" cy="4351338"/>
+            <a:off x="838200" y="934365"/>
+            <a:ext cx="5181600" cy="2227039"/>
           </a:xfrm>
         </p:spPr>
         <p:txBody>
@@ -1183,13 +1186,13 @@
               <a:rPr lang="pt-BR" smtClean="0"/>
               <a:t>Quinto nível</a:t>
             </a:r>
-            <a:endParaRPr lang="pt-BR"/>
-          </a:p>
-        </p:txBody>
-      </p:sp>
-      <p:sp>
-        <p:nvSpPr>
-          <p:cNvPr id="4" name="Espaço Reservado para Conteúdo 3"/>
+            <a:endParaRPr lang="en-US" dirty="0"/>
+          </a:p>
+        </p:txBody>
+      </p:sp>
+      <p:sp>
+        <p:nvSpPr>
+          <p:cNvPr id="4" name="Content Placeholder 3"/>
           <p:cNvSpPr>
             <a:spLocks noGrp="1"/>
           </p:cNvSpPr>
@@ -1199,8 +1202,8 @@
         </p:nvSpPr>
         <p:spPr>
           <a:xfrm>
-            <a:off x="6172200" y="1825625"/>
-            <a:ext cx="5181600" cy="4351338"/>
+            <a:off x="6172200" y="934365"/>
+            <a:ext cx="5181600" cy="2227039"/>
           </a:xfrm>
         </p:spPr>
         <p:txBody>
@@ -1240,13 +1243,13 @@
               <a:rPr lang="pt-BR" smtClean="0"/>
               <a:t>Quinto nível</a:t>
             </a:r>
-            <a:endParaRPr lang="pt-BR"/>
-          </a:p>
-        </p:txBody>
-      </p:sp>
-      <p:sp>
-        <p:nvSpPr>
-          <p:cNvPr id="5" name="Espaço Reservado para Data 4"/>
+            <a:endParaRPr lang="en-US" dirty="0"/>
+          </a:p>
+        </p:txBody>
+      </p:sp>
+      <p:sp>
+        <p:nvSpPr>
+          <p:cNvPr id="5" name="Date Placeholder 4"/>
           <p:cNvSpPr>
             <a:spLocks noGrp="1"/>
           </p:cNvSpPr>
@@ -1261,7 +1264,7 @@
           <a:p>
             <a:fld id="{0B5757C9-29C2-4B15-96BC-892616DC4387}" type="datetimeFigureOut">
               <a:rPr lang="pt-BR" smtClean="0"/>
-              <a:t>04/05/2022</a:t>
+              <a:t>08/05/2022</a:t>
             </a:fld>
             <a:endParaRPr lang="pt-BR"/>
           </a:p>
@@ -1269,7 +1272,7 @@
       </p:sp>
       <p:sp>
         <p:nvSpPr>
-          <p:cNvPr id="6" name="Espaço Reservado para Rodapé 5"/>
+          <p:cNvPr id="6" name="Footer Placeholder 5"/>
           <p:cNvSpPr>
             <a:spLocks noGrp="1"/>
           </p:cNvSpPr>
@@ -1288,7 +1291,7 @@
       </p:sp>
       <p:sp>
         <p:nvSpPr>
-          <p:cNvPr id="7" name="Espaço Reservado para Número de Slide 6"/>
+          <p:cNvPr id="7" name="Slide Number Placeholder 6"/>
           <p:cNvSpPr>
             <a:spLocks noGrp="1"/>
           </p:cNvSpPr>
@@ -1312,7 +1315,7 @@
     </p:spTree>
     <p:extLst>
       <p:ext uri="{BB962C8B-B14F-4D97-AF65-F5344CB8AC3E}">
-        <p14:creationId xmlns:p14="http://schemas.microsoft.com/office/powerpoint/2010/main" val="1899315793"/>
+        <p14:creationId xmlns:p14="http://schemas.microsoft.com/office/powerpoint/2010/main" val="681804799"/>
       </p:ext>
     </p:extLst>
   </p:cSld>
@@ -1341,7 +1344,7 @@
       </p:grpSpPr>
       <p:sp>
         <p:nvSpPr>
-          <p:cNvPr id="2" name="Título 1"/>
+          <p:cNvPr id="2" name="Title 1"/>
           <p:cNvSpPr>
             <a:spLocks noGrp="1"/>
           </p:cNvSpPr>
@@ -1351,8 +1354,8 @@
         </p:nvSpPr>
         <p:spPr>
           <a:xfrm>
-            <a:off x="839788" y="365125"/>
-            <a:ext cx="10515600" cy="1325563"/>
+            <a:off x="839788" y="186873"/>
+            <a:ext cx="10515600" cy="678431"/>
           </a:xfrm>
         </p:spPr>
         <p:txBody>
@@ -1363,13 +1366,13 @@
               <a:rPr lang="pt-BR" smtClean="0"/>
               <a:t>Clique para editar o título mestre</a:t>
             </a:r>
-            <a:endParaRPr lang="pt-BR"/>
-          </a:p>
-        </p:txBody>
-      </p:sp>
-      <p:sp>
-        <p:nvSpPr>
-          <p:cNvPr id="3" name="Espaço Reservado para Texto 2"/>
+            <a:endParaRPr lang="en-US" dirty="0"/>
+          </a:p>
+        </p:txBody>
+      </p:sp>
+      <p:sp>
+        <p:nvSpPr>
+          <p:cNvPr id="3" name="Text Placeholder 2"/>
           <p:cNvSpPr>
             <a:spLocks noGrp="1"/>
           </p:cNvSpPr>
@@ -1379,8 +1382,8 @@
         </p:nvSpPr>
         <p:spPr>
           <a:xfrm>
-            <a:off x="839788" y="1681163"/>
-            <a:ext cx="5157787" cy="823912"/>
+            <a:off x="839789" y="860429"/>
+            <a:ext cx="5157787" cy="421683"/>
           </a:xfrm>
         </p:spPr>
         <p:txBody>
@@ -1388,39 +1391,39 @@
           <a:lstStyle>
             <a:lvl1pPr marL="0" indent="0">
               <a:buNone/>
-              <a:defRPr sz="2400" b="1"/>
+              <a:defRPr sz="1228" b="1"/>
             </a:lvl1pPr>
-            <a:lvl2pPr marL="457200" indent="0">
+            <a:lvl2pPr marL="233995" indent="0">
               <a:buNone/>
-              <a:defRPr sz="2000" b="1"/>
+              <a:defRPr sz="1024" b="1"/>
             </a:lvl2pPr>
-            <a:lvl3pPr marL="914400" indent="0">
+            <a:lvl3pPr marL="467990" indent="0">
               <a:buNone/>
-              <a:defRPr sz="1800" b="1"/>
+              <a:defRPr sz="921" b="1"/>
             </a:lvl3pPr>
-            <a:lvl4pPr marL="1371600" indent="0">
+            <a:lvl4pPr marL="701985" indent="0">
               <a:buNone/>
-              <a:defRPr sz="1600" b="1"/>
+              <a:defRPr sz="819" b="1"/>
             </a:lvl4pPr>
-            <a:lvl5pPr marL="1828800" indent="0">
+            <a:lvl5pPr marL="935980" indent="0">
               <a:buNone/>
-              <a:defRPr sz="1600" b="1"/>
+              <a:defRPr sz="819" b="1"/>
             </a:lvl5pPr>
-            <a:lvl6pPr marL="2286000" indent="0">
+            <a:lvl6pPr marL="1169975" indent="0">
               <a:buNone/>
-              <a:defRPr sz="1600" b="1"/>
+              <a:defRPr sz="819" b="1"/>
             </a:lvl6pPr>
-            <a:lvl7pPr marL="2743200" indent="0">
+            <a:lvl7pPr marL="1403970" indent="0">
               <a:buNone/>
-              <a:defRPr sz="1600" b="1"/>
+              <a:defRPr sz="819" b="1"/>
             </a:lvl7pPr>
-            <a:lvl8pPr marL="3200400" indent="0">
+            <a:lvl8pPr marL="1637965" indent="0">
               <a:buNone/>
-              <a:defRPr sz="1600" b="1"/>
+              <a:defRPr sz="819" b="1"/>
             </a:lvl8pPr>
-            <a:lvl9pPr marL="3657600" indent="0">
+            <a:lvl9pPr marL="1871960" indent="0">
               <a:buNone/>
-              <a:defRPr sz="1600" b="1"/>
+              <a:defRPr sz="819" b="1"/>
             </a:lvl9pPr>
           </a:lstStyle>
           <a:p>
@@ -1434,7 +1437,7 @@
       </p:sp>
       <p:sp>
         <p:nvSpPr>
-          <p:cNvPr id="4" name="Espaço Reservado para Conteúdo 3"/>
+          <p:cNvPr id="4" name="Content Placeholder 3"/>
           <p:cNvSpPr>
             <a:spLocks noGrp="1"/>
           </p:cNvSpPr>
@@ -1444,8 +1447,8 @@
         </p:nvSpPr>
         <p:spPr>
           <a:xfrm>
-            <a:off x="839788" y="2505075"/>
-            <a:ext cx="5157787" cy="3684588"/>
+            <a:off x="839789" y="1282111"/>
+            <a:ext cx="5157787" cy="1885793"/>
           </a:xfrm>
         </p:spPr>
         <p:txBody>
@@ -1485,13 +1488,13 @@
               <a:rPr lang="pt-BR" smtClean="0"/>
               <a:t>Quinto nível</a:t>
             </a:r>
-            <a:endParaRPr lang="pt-BR"/>
-          </a:p>
-        </p:txBody>
-      </p:sp>
-      <p:sp>
-        <p:nvSpPr>
-          <p:cNvPr id="5" name="Espaço Reservado para Texto 4"/>
+            <a:endParaRPr lang="en-US" dirty="0"/>
+          </a:p>
+        </p:txBody>
+      </p:sp>
+      <p:sp>
+        <p:nvSpPr>
+          <p:cNvPr id="5" name="Text Placeholder 4"/>
           <p:cNvSpPr>
             <a:spLocks noGrp="1"/>
           </p:cNvSpPr>
@@ -1501,8 +1504,8 @@
         </p:nvSpPr>
         <p:spPr>
           <a:xfrm>
-            <a:off x="6172200" y="1681163"/>
-            <a:ext cx="5183188" cy="823912"/>
+            <a:off x="6172200" y="860429"/>
+            <a:ext cx="5183188" cy="421683"/>
           </a:xfrm>
         </p:spPr>
         <p:txBody>
@@ -1510,39 +1513,39 @@
           <a:lstStyle>
             <a:lvl1pPr marL="0" indent="0">
               <a:buNone/>
-              <a:defRPr sz="2400" b="1"/>
+              <a:defRPr sz="1228" b="1"/>
             </a:lvl1pPr>
-            <a:lvl2pPr marL="457200" indent="0">
+            <a:lvl2pPr marL="233995" indent="0">
               <a:buNone/>
-              <a:defRPr sz="2000" b="1"/>
+              <a:defRPr sz="1024" b="1"/>
             </a:lvl2pPr>
-            <a:lvl3pPr marL="914400" indent="0">
+            <a:lvl3pPr marL="467990" indent="0">
               <a:buNone/>
-              <a:defRPr sz="1800" b="1"/>
+              <a:defRPr sz="921" b="1"/>
             </a:lvl3pPr>
-            <a:lvl4pPr marL="1371600" indent="0">
+            <a:lvl4pPr marL="701985" indent="0">
               <a:buNone/>
-              <a:defRPr sz="1600" b="1"/>
+              <a:defRPr sz="819" b="1"/>
             </a:lvl4pPr>
-            <a:lvl5pPr marL="1828800" indent="0">
+            <a:lvl5pPr marL="935980" indent="0">
               <a:buNone/>
-              <a:defRPr sz="1600" b="1"/>
+              <a:defRPr sz="819" b="1"/>
             </a:lvl5pPr>
-            <a:lvl6pPr marL="2286000" indent="0">
+            <a:lvl6pPr marL="1169975" indent="0">
               <a:buNone/>
-              <a:defRPr sz="1600" b="1"/>
+              <a:defRPr sz="819" b="1"/>
             </a:lvl6pPr>
-            <a:lvl7pPr marL="2743200" indent="0">
+            <a:lvl7pPr marL="1403970" indent="0">
               <a:buNone/>
-              <a:defRPr sz="1600" b="1"/>
+              <a:defRPr sz="819" b="1"/>
             </a:lvl7pPr>
-            <a:lvl8pPr marL="3200400" indent="0">
+            <a:lvl8pPr marL="1637965" indent="0">
               <a:buNone/>
-              <a:defRPr sz="1600" b="1"/>
+              <a:defRPr sz="819" b="1"/>
             </a:lvl8pPr>
-            <a:lvl9pPr marL="3657600" indent="0">
+            <a:lvl9pPr marL="1871960" indent="0">
               <a:buNone/>
-              <a:defRPr sz="1600" b="1"/>
+              <a:defRPr sz="819" b="1"/>
             </a:lvl9pPr>
           </a:lstStyle>
           <a:p>
@@ -1556,7 +1559,7 @@
       </p:sp>
       <p:sp>
         <p:nvSpPr>
-          <p:cNvPr id="6" name="Espaço Reservado para Conteúdo 5"/>
+          <p:cNvPr id="6" name="Content Placeholder 5"/>
           <p:cNvSpPr>
             <a:spLocks noGrp="1"/>
           </p:cNvSpPr>
@@ -1566,8 +1569,8 @@
         </p:nvSpPr>
         <p:spPr>
           <a:xfrm>
-            <a:off x="6172200" y="2505075"/>
-            <a:ext cx="5183188" cy="3684588"/>
+            <a:off x="6172200" y="1282111"/>
+            <a:ext cx="5183188" cy="1885793"/>
           </a:xfrm>
         </p:spPr>
         <p:txBody>
@@ -1607,13 +1610,13 @@
               <a:rPr lang="pt-BR" smtClean="0"/>
               <a:t>Quinto nível</a:t>
             </a:r>
-            <a:endParaRPr lang="pt-BR"/>
-          </a:p>
-        </p:txBody>
-      </p:sp>
-      <p:sp>
-        <p:nvSpPr>
-          <p:cNvPr id="7" name="Espaço Reservado para Data 6"/>
+            <a:endParaRPr lang="en-US" dirty="0"/>
+          </a:p>
+        </p:txBody>
+      </p:sp>
+      <p:sp>
+        <p:nvSpPr>
+          <p:cNvPr id="7" name="Date Placeholder 6"/>
           <p:cNvSpPr>
             <a:spLocks noGrp="1"/>
           </p:cNvSpPr>
@@ -1628,7 +1631,7 @@
           <a:p>
             <a:fld id="{0B5757C9-29C2-4B15-96BC-892616DC4387}" type="datetimeFigureOut">
               <a:rPr lang="pt-BR" smtClean="0"/>
-              <a:t>04/05/2022</a:t>
+              <a:t>08/05/2022</a:t>
             </a:fld>
             <a:endParaRPr lang="pt-BR"/>
           </a:p>
@@ -1636,7 +1639,7 @@
       </p:sp>
       <p:sp>
         <p:nvSpPr>
-          <p:cNvPr id="8" name="Espaço Reservado para Rodapé 7"/>
+          <p:cNvPr id="8" name="Footer Placeholder 7"/>
           <p:cNvSpPr>
             <a:spLocks noGrp="1"/>
           </p:cNvSpPr>
@@ -1655,7 +1658,7 @@
       </p:sp>
       <p:sp>
         <p:nvSpPr>
-          <p:cNvPr id="9" name="Espaço Reservado para Número de Slide 8"/>
+          <p:cNvPr id="9" name="Slide Number Placeholder 8"/>
           <p:cNvSpPr>
             <a:spLocks noGrp="1"/>
           </p:cNvSpPr>
@@ -1679,7 +1682,7 @@
     </p:spTree>
     <p:extLst>
       <p:ext uri="{BB962C8B-B14F-4D97-AF65-F5344CB8AC3E}">
-        <p14:creationId xmlns:p14="http://schemas.microsoft.com/office/powerpoint/2010/main" val="3056132329"/>
+        <p14:creationId xmlns:p14="http://schemas.microsoft.com/office/powerpoint/2010/main" val="3279990019"/>
       </p:ext>
     </p:extLst>
   </p:cSld>
@@ -1708,7 +1711,7 @@
       </p:grpSpPr>
       <p:sp>
         <p:nvSpPr>
-          <p:cNvPr id="2" name="Título 1"/>
+          <p:cNvPr id="2" name="Title 1"/>
           <p:cNvSpPr>
             <a:spLocks noGrp="1"/>
           </p:cNvSpPr>
@@ -1725,13 +1728,13 @@
               <a:rPr lang="pt-BR" smtClean="0"/>
               <a:t>Clique para editar o título mestre</a:t>
             </a:r>
-            <a:endParaRPr lang="pt-BR"/>
-          </a:p>
-        </p:txBody>
-      </p:sp>
-      <p:sp>
-        <p:nvSpPr>
-          <p:cNvPr id="3" name="Espaço Reservado para Data 2"/>
+            <a:endParaRPr lang="en-US" dirty="0"/>
+          </a:p>
+        </p:txBody>
+      </p:sp>
+      <p:sp>
+        <p:nvSpPr>
+          <p:cNvPr id="3" name="Date Placeholder 2"/>
           <p:cNvSpPr>
             <a:spLocks noGrp="1"/>
           </p:cNvSpPr>
@@ -1746,7 +1749,7 @@
           <a:p>
             <a:fld id="{0B5757C9-29C2-4B15-96BC-892616DC4387}" type="datetimeFigureOut">
               <a:rPr lang="pt-BR" smtClean="0"/>
-              <a:t>04/05/2022</a:t>
+              <a:t>08/05/2022</a:t>
             </a:fld>
             <a:endParaRPr lang="pt-BR"/>
           </a:p>
@@ -1754,7 +1757,7 @@
       </p:sp>
       <p:sp>
         <p:nvSpPr>
-          <p:cNvPr id="4" name="Espaço Reservado para Rodapé 3"/>
+          <p:cNvPr id="4" name="Footer Placeholder 3"/>
           <p:cNvSpPr>
             <a:spLocks noGrp="1"/>
           </p:cNvSpPr>
@@ -1773,7 +1776,7 @@
       </p:sp>
       <p:sp>
         <p:nvSpPr>
-          <p:cNvPr id="5" name="Espaço Reservado para Número de Slide 4"/>
+          <p:cNvPr id="5" name="Slide Number Placeholder 4"/>
           <p:cNvSpPr>
             <a:spLocks noGrp="1"/>
           </p:cNvSpPr>
@@ -1797,7 +1800,7 @@
     </p:spTree>
     <p:extLst>
       <p:ext uri="{BB962C8B-B14F-4D97-AF65-F5344CB8AC3E}">
-        <p14:creationId xmlns:p14="http://schemas.microsoft.com/office/powerpoint/2010/main" val="1071171310"/>
+        <p14:creationId xmlns:p14="http://schemas.microsoft.com/office/powerpoint/2010/main" val="295280737"/>
       </p:ext>
     </p:extLst>
   </p:cSld>
@@ -1826,7 +1829,7 @@
       </p:grpSpPr>
       <p:sp>
         <p:nvSpPr>
-          <p:cNvPr id="2" name="Espaço Reservado para Data 1"/>
+          <p:cNvPr id="2" name="Date Placeholder 1"/>
           <p:cNvSpPr>
             <a:spLocks noGrp="1"/>
           </p:cNvSpPr>
@@ -1841,7 +1844,7 @@
           <a:p>
             <a:fld id="{0B5757C9-29C2-4B15-96BC-892616DC4387}" type="datetimeFigureOut">
               <a:rPr lang="pt-BR" smtClean="0"/>
-              <a:t>04/05/2022</a:t>
+              <a:t>08/05/2022</a:t>
             </a:fld>
             <a:endParaRPr lang="pt-BR"/>
           </a:p>
@@ -1849,7 +1852,7 @@
       </p:sp>
       <p:sp>
         <p:nvSpPr>
-          <p:cNvPr id="3" name="Espaço Reservado para Rodapé 2"/>
+          <p:cNvPr id="3" name="Footer Placeholder 2"/>
           <p:cNvSpPr>
             <a:spLocks noGrp="1"/>
           </p:cNvSpPr>
@@ -1868,7 +1871,7 @@
       </p:sp>
       <p:sp>
         <p:nvSpPr>
-          <p:cNvPr id="4" name="Espaço Reservado para Número de Slide 3"/>
+          <p:cNvPr id="4" name="Slide Number Placeholder 3"/>
           <p:cNvSpPr>
             <a:spLocks noGrp="1"/>
           </p:cNvSpPr>
@@ -1892,7 +1895,7 @@
     </p:spTree>
     <p:extLst>
       <p:ext uri="{BB962C8B-B14F-4D97-AF65-F5344CB8AC3E}">
-        <p14:creationId xmlns:p14="http://schemas.microsoft.com/office/powerpoint/2010/main" val="3259078164"/>
+        <p14:creationId xmlns:p14="http://schemas.microsoft.com/office/powerpoint/2010/main" val="4070660929"/>
       </p:ext>
     </p:extLst>
   </p:cSld>
@@ -1921,7 +1924,7 @@
       </p:grpSpPr>
       <p:sp>
         <p:nvSpPr>
-          <p:cNvPr id="2" name="Título 1"/>
+          <p:cNvPr id="2" name="Title 1"/>
           <p:cNvSpPr>
             <a:spLocks noGrp="1"/>
           </p:cNvSpPr>
@@ -1931,15 +1934,15 @@
         </p:nvSpPr>
         <p:spPr>
           <a:xfrm>
-            <a:off x="839788" y="457200"/>
-            <a:ext cx="3932237" cy="1600200"/>
+            <a:off x="839789" y="233998"/>
+            <a:ext cx="3932237" cy="818991"/>
           </a:xfrm>
         </p:spPr>
         <p:txBody>
           <a:bodyPr anchor="b"/>
           <a:lstStyle>
             <a:lvl1pPr>
-              <a:defRPr sz="3200"/>
+              <a:defRPr sz="1638"/>
             </a:lvl1pPr>
           </a:lstStyle>
           <a:p>
@@ -1947,13 +1950,13 @@
               <a:rPr lang="pt-BR" smtClean="0"/>
               <a:t>Clique para editar o título mestre</a:t>
             </a:r>
-            <a:endParaRPr lang="pt-BR"/>
-          </a:p>
-        </p:txBody>
-      </p:sp>
-      <p:sp>
-        <p:nvSpPr>
-          <p:cNvPr id="3" name="Espaço Reservado para Conteúdo 2"/>
+            <a:endParaRPr lang="en-US" dirty="0"/>
+          </a:p>
+        </p:txBody>
+      </p:sp>
+      <p:sp>
+        <p:nvSpPr>
+          <p:cNvPr id="3" name="Content Placeholder 2"/>
           <p:cNvSpPr>
             <a:spLocks noGrp="1"/>
           </p:cNvSpPr>
@@ -1963,39 +1966,39 @@
         </p:nvSpPr>
         <p:spPr>
           <a:xfrm>
-            <a:off x="5183188" y="987425"/>
-            <a:ext cx="6172200" cy="4873625"/>
+            <a:off x="5183188" y="505370"/>
+            <a:ext cx="6172200" cy="2494349"/>
           </a:xfrm>
         </p:spPr>
         <p:txBody>
           <a:bodyPr/>
           <a:lstStyle>
             <a:lvl1pPr>
-              <a:defRPr sz="3200"/>
+              <a:defRPr sz="1638"/>
             </a:lvl1pPr>
             <a:lvl2pPr>
-              <a:defRPr sz="2800"/>
+              <a:defRPr sz="1433"/>
             </a:lvl2pPr>
             <a:lvl3pPr>
-              <a:defRPr sz="2400"/>
+              <a:defRPr sz="1228"/>
             </a:lvl3pPr>
             <a:lvl4pPr>
-              <a:defRPr sz="2000"/>
+              <a:defRPr sz="1024"/>
             </a:lvl4pPr>
             <a:lvl5pPr>
-              <a:defRPr sz="2000"/>
+              <a:defRPr sz="1024"/>
             </a:lvl5pPr>
             <a:lvl6pPr>
-              <a:defRPr sz="2000"/>
+              <a:defRPr sz="1024"/>
             </a:lvl6pPr>
             <a:lvl7pPr>
-              <a:defRPr sz="2000"/>
+              <a:defRPr sz="1024"/>
             </a:lvl7pPr>
             <a:lvl8pPr>
-              <a:defRPr sz="2000"/>
+              <a:defRPr sz="1024"/>
             </a:lvl8pPr>
             <a:lvl9pPr>
-              <a:defRPr sz="2000"/>
+              <a:defRPr sz="1024"/>
             </a:lvl9pPr>
           </a:lstStyle>
           <a:p>
@@ -2032,13 +2035,13 @@
               <a:rPr lang="pt-BR" smtClean="0"/>
               <a:t>Quinto nível</a:t>
             </a:r>
-            <a:endParaRPr lang="pt-BR"/>
-          </a:p>
-        </p:txBody>
-      </p:sp>
-      <p:sp>
-        <p:nvSpPr>
-          <p:cNvPr id="4" name="Espaço Reservado para Texto 3"/>
+            <a:endParaRPr lang="en-US" dirty="0"/>
+          </a:p>
+        </p:txBody>
+      </p:sp>
+      <p:sp>
+        <p:nvSpPr>
+          <p:cNvPr id="4" name="Text Placeholder 3"/>
           <p:cNvSpPr>
             <a:spLocks noGrp="1"/>
           </p:cNvSpPr>
@@ -2048,8 +2051,8 @@
         </p:nvSpPr>
         <p:spPr>
           <a:xfrm>
-            <a:off x="839788" y="2057400"/>
-            <a:ext cx="3932237" cy="3811588"/>
+            <a:off x="839789" y="1052989"/>
+            <a:ext cx="3932237" cy="1950792"/>
           </a:xfrm>
         </p:spPr>
         <p:txBody>
@@ -2057,39 +2060,39 @@
           <a:lstStyle>
             <a:lvl1pPr marL="0" indent="0">
               <a:buNone/>
-              <a:defRPr sz="1600"/>
+              <a:defRPr sz="819"/>
             </a:lvl1pPr>
-            <a:lvl2pPr marL="457200" indent="0">
+            <a:lvl2pPr marL="233995" indent="0">
               <a:buNone/>
-              <a:defRPr sz="1400"/>
+              <a:defRPr sz="717"/>
             </a:lvl2pPr>
-            <a:lvl3pPr marL="914400" indent="0">
+            <a:lvl3pPr marL="467990" indent="0">
               <a:buNone/>
-              <a:defRPr sz="1200"/>
+              <a:defRPr sz="614"/>
             </a:lvl3pPr>
-            <a:lvl4pPr marL="1371600" indent="0">
+            <a:lvl4pPr marL="701985" indent="0">
               <a:buNone/>
-              <a:defRPr sz="1000"/>
+              <a:defRPr sz="512"/>
             </a:lvl4pPr>
-            <a:lvl5pPr marL="1828800" indent="0">
+            <a:lvl5pPr marL="935980" indent="0">
               <a:buNone/>
-              <a:defRPr sz="1000"/>
+              <a:defRPr sz="512"/>
             </a:lvl5pPr>
-            <a:lvl6pPr marL="2286000" indent="0">
+            <a:lvl6pPr marL="1169975" indent="0">
               <a:buNone/>
-              <a:defRPr sz="1000"/>
+              <a:defRPr sz="512"/>
             </a:lvl6pPr>
-            <a:lvl7pPr marL="2743200" indent="0">
+            <a:lvl7pPr marL="1403970" indent="0">
               <a:buNone/>
-              <a:defRPr sz="1000"/>
+              <a:defRPr sz="512"/>
             </a:lvl7pPr>
-            <a:lvl8pPr marL="3200400" indent="0">
+            <a:lvl8pPr marL="1637965" indent="0">
               <a:buNone/>
-              <a:defRPr sz="1000"/>
+              <a:defRPr sz="512"/>
             </a:lvl8pPr>
-            <a:lvl9pPr marL="3657600" indent="0">
+            <a:lvl9pPr marL="1871960" indent="0">
               <a:buNone/>
-              <a:defRPr sz="1000"/>
+              <a:defRPr sz="512"/>
             </a:lvl9pPr>
           </a:lstStyle>
           <a:p>
@@ -2103,7 +2106,7 @@
       </p:sp>
       <p:sp>
         <p:nvSpPr>
-          <p:cNvPr id="5" name="Espaço Reservado para Data 4"/>
+          <p:cNvPr id="5" name="Date Placeholder 4"/>
           <p:cNvSpPr>
             <a:spLocks noGrp="1"/>
           </p:cNvSpPr>
@@ -2118,7 +2121,7 @@
           <a:p>
             <a:fld id="{0B5757C9-29C2-4B15-96BC-892616DC4387}" type="datetimeFigureOut">
               <a:rPr lang="pt-BR" smtClean="0"/>
-              <a:t>04/05/2022</a:t>
+              <a:t>08/05/2022</a:t>
             </a:fld>
             <a:endParaRPr lang="pt-BR"/>
           </a:p>
@@ -2126,7 +2129,7 @@
       </p:sp>
       <p:sp>
         <p:nvSpPr>
-          <p:cNvPr id="6" name="Espaço Reservado para Rodapé 5"/>
+          <p:cNvPr id="6" name="Footer Placeholder 5"/>
           <p:cNvSpPr>
             <a:spLocks noGrp="1"/>
           </p:cNvSpPr>
@@ -2145,7 +2148,7 @@
       </p:sp>
       <p:sp>
         <p:nvSpPr>
-          <p:cNvPr id="7" name="Espaço Reservado para Número de Slide 6"/>
+          <p:cNvPr id="7" name="Slide Number Placeholder 6"/>
           <p:cNvSpPr>
             <a:spLocks noGrp="1"/>
           </p:cNvSpPr>
@@ -2169,7 +2172,7 @@
     </p:spTree>
     <p:extLst>
       <p:ext uri="{BB962C8B-B14F-4D97-AF65-F5344CB8AC3E}">
-        <p14:creationId xmlns:p14="http://schemas.microsoft.com/office/powerpoint/2010/main" val="396817288"/>
+        <p14:creationId xmlns:p14="http://schemas.microsoft.com/office/powerpoint/2010/main" val="816020875"/>
       </p:ext>
     </p:extLst>
   </p:cSld>
@@ -2198,7 +2201,7 @@
       </p:grpSpPr>
       <p:sp>
         <p:nvSpPr>
-          <p:cNvPr id="2" name="Título 1"/>
+          <p:cNvPr id="2" name="Title 1"/>
           <p:cNvSpPr>
             <a:spLocks noGrp="1"/>
           </p:cNvSpPr>
@@ -2208,15 +2211,15 @@
         </p:nvSpPr>
         <p:spPr>
           <a:xfrm>
-            <a:off x="839788" y="457200"/>
-            <a:ext cx="3932237" cy="1600200"/>
+            <a:off x="839789" y="233998"/>
+            <a:ext cx="3932237" cy="818991"/>
           </a:xfrm>
         </p:spPr>
         <p:txBody>
           <a:bodyPr anchor="b"/>
           <a:lstStyle>
             <a:lvl1pPr>
-              <a:defRPr sz="3200"/>
+              <a:defRPr sz="1638"/>
             </a:lvl1pPr>
           </a:lstStyle>
           <a:p>
@@ -2224,15 +2227,15 @@
               <a:rPr lang="pt-BR" smtClean="0"/>
               <a:t>Clique para editar o título mestre</a:t>
             </a:r>
-            <a:endParaRPr lang="pt-BR"/>
-          </a:p>
-        </p:txBody>
-      </p:sp>
-      <p:sp>
-        <p:nvSpPr>
-          <p:cNvPr id="3" name="Espaço Reservado para Imagem 2"/>
+            <a:endParaRPr lang="en-US" dirty="0"/>
+          </a:p>
+        </p:txBody>
+      </p:sp>
+      <p:sp>
+        <p:nvSpPr>
+          <p:cNvPr id="3" name="Picture Placeholder 2"/>
           <p:cNvSpPr>
-            <a:spLocks noGrp="1"/>
+            <a:spLocks noGrp="1" noChangeAspect="1"/>
           </p:cNvSpPr>
           <p:nvPr>
             <p:ph type="pic" idx="1"/>
@@ -2240,58 +2243,62 @@
         </p:nvSpPr>
         <p:spPr>
           <a:xfrm>
-            <a:off x="5183188" y="987425"/>
-            <a:ext cx="6172200" cy="4873625"/>
-          </a:xfrm>
-        </p:spPr>
-        <p:txBody>
-          <a:bodyPr/>
+            <a:off x="5183188" y="505370"/>
+            <a:ext cx="6172200" cy="2494349"/>
+          </a:xfrm>
+        </p:spPr>
+        <p:txBody>
+          <a:bodyPr anchor="t"/>
           <a:lstStyle>
             <a:lvl1pPr marL="0" indent="0">
               <a:buNone/>
-              <a:defRPr sz="3200"/>
+              <a:defRPr sz="1638"/>
             </a:lvl1pPr>
-            <a:lvl2pPr marL="457200" indent="0">
+            <a:lvl2pPr marL="233995" indent="0">
               <a:buNone/>
-              <a:defRPr sz="2800"/>
+              <a:defRPr sz="1433"/>
             </a:lvl2pPr>
-            <a:lvl3pPr marL="914400" indent="0">
+            <a:lvl3pPr marL="467990" indent="0">
               <a:buNone/>
-              <a:defRPr sz="2400"/>
+              <a:defRPr sz="1228"/>
             </a:lvl3pPr>
-            <a:lvl4pPr marL="1371600" indent="0">
+            <a:lvl4pPr marL="701985" indent="0">
               <a:buNone/>
-              <a:defRPr sz="2000"/>
+              <a:defRPr sz="1024"/>
             </a:lvl4pPr>
-            <a:lvl5pPr marL="1828800" indent="0">
+            <a:lvl5pPr marL="935980" indent="0">
               <a:buNone/>
-              <a:defRPr sz="2000"/>
+              <a:defRPr sz="1024"/>
             </a:lvl5pPr>
-            <a:lvl6pPr marL="2286000" indent="0">
+            <a:lvl6pPr marL="1169975" indent="0">
               <a:buNone/>
-              <a:defRPr sz="2000"/>
+              <a:defRPr sz="1024"/>
             </a:lvl6pPr>
-            <a:lvl7pPr marL="2743200" indent="0">
+            <a:lvl7pPr marL="1403970" indent="0">
               <a:buNone/>
-              <a:defRPr sz="2000"/>
+              <a:defRPr sz="1024"/>
             </a:lvl7pPr>
-            <a:lvl8pPr marL="3200400" indent="0">
+            <a:lvl8pPr marL="1637965" indent="0">
               <a:buNone/>
-              <a:defRPr sz="2000"/>
+              <a:defRPr sz="1024"/>
             </a:lvl8pPr>
-            <a:lvl9pPr marL="3657600" indent="0">
+            <a:lvl9pPr marL="1871960" indent="0">
               <a:buNone/>
-              <a:defRPr sz="2000"/>
+              <a:defRPr sz="1024"/>
             </a:lvl9pPr>
           </a:lstStyle>
           <a:p>
-            <a:endParaRPr lang="pt-BR"/>
-          </a:p>
-        </p:txBody>
-      </p:sp>
-      <p:sp>
-        <p:nvSpPr>
-          <p:cNvPr id="4" name="Espaço Reservado para Texto 3"/>
+            <a:r>
+              <a:rPr lang="pt-BR" smtClean="0"/>
+              <a:t>Clique no ícone para adicionar uma imagem</a:t>
+            </a:r>
+            <a:endParaRPr lang="en-US" dirty="0"/>
+          </a:p>
+        </p:txBody>
+      </p:sp>
+      <p:sp>
+        <p:nvSpPr>
+          <p:cNvPr id="4" name="Text Placeholder 3"/>
           <p:cNvSpPr>
             <a:spLocks noGrp="1"/>
           </p:cNvSpPr>
@@ -2301,8 +2308,8 @@
         </p:nvSpPr>
         <p:spPr>
           <a:xfrm>
-            <a:off x="839788" y="2057400"/>
-            <a:ext cx="3932237" cy="3811588"/>
+            <a:off x="839789" y="1052989"/>
+            <a:ext cx="3932237" cy="1950792"/>
           </a:xfrm>
         </p:spPr>
         <p:txBody>
@@ -2310,39 +2317,39 @@
           <a:lstStyle>
             <a:lvl1pPr marL="0" indent="0">
               <a:buNone/>
-              <a:defRPr sz="1600"/>
+              <a:defRPr sz="819"/>
             </a:lvl1pPr>
-            <a:lvl2pPr marL="457200" indent="0">
+            <a:lvl2pPr marL="233995" indent="0">
               <a:buNone/>
-              <a:defRPr sz="1400"/>
+              <a:defRPr sz="717"/>
             </a:lvl2pPr>
-            <a:lvl3pPr marL="914400" indent="0">
+            <a:lvl3pPr marL="467990" indent="0">
               <a:buNone/>
-              <a:defRPr sz="1200"/>
+              <a:defRPr sz="614"/>
             </a:lvl3pPr>
-            <a:lvl4pPr marL="1371600" indent="0">
+            <a:lvl4pPr marL="701985" indent="0">
               <a:buNone/>
-              <a:defRPr sz="1000"/>
+              <a:defRPr sz="512"/>
             </a:lvl4pPr>
-            <a:lvl5pPr marL="1828800" indent="0">
+            <a:lvl5pPr marL="935980" indent="0">
               <a:buNone/>
-              <a:defRPr sz="1000"/>
+              <a:defRPr sz="512"/>
             </a:lvl5pPr>
-            <a:lvl6pPr marL="2286000" indent="0">
+            <a:lvl6pPr marL="1169975" indent="0">
               <a:buNone/>
-              <a:defRPr sz="1000"/>
+              <a:defRPr sz="512"/>
             </a:lvl6pPr>
-            <a:lvl7pPr marL="2743200" indent="0">
+            <a:lvl7pPr marL="1403970" indent="0">
               <a:buNone/>
-              <a:defRPr sz="1000"/>
+              <a:defRPr sz="512"/>
             </a:lvl7pPr>
-            <a:lvl8pPr marL="3200400" indent="0">
+            <a:lvl8pPr marL="1637965" indent="0">
               <a:buNone/>
-              <a:defRPr sz="1000"/>
+              <a:defRPr sz="512"/>
             </a:lvl8pPr>
-            <a:lvl9pPr marL="3657600" indent="0">
+            <a:lvl9pPr marL="1871960" indent="0">
               <a:buNone/>
-              <a:defRPr sz="1000"/>
+              <a:defRPr sz="512"/>
             </a:lvl9pPr>
           </a:lstStyle>
           <a:p>
@@ -2356,7 +2363,7 @@
       </p:sp>
       <p:sp>
         <p:nvSpPr>
-          <p:cNvPr id="5" name="Espaço Reservado para Data 4"/>
+          <p:cNvPr id="5" name="Date Placeholder 4"/>
           <p:cNvSpPr>
             <a:spLocks noGrp="1"/>
           </p:cNvSpPr>
@@ -2371,7 +2378,7 @@
           <a:p>
             <a:fld id="{0B5757C9-29C2-4B15-96BC-892616DC4387}" type="datetimeFigureOut">
               <a:rPr lang="pt-BR" smtClean="0"/>
-              <a:t>04/05/2022</a:t>
+              <a:t>08/05/2022</a:t>
             </a:fld>
             <a:endParaRPr lang="pt-BR"/>
           </a:p>
@@ -2379,7 +2386,7 @@
       </p:sp>
       <p:sp>
         <p:nvSpPr>
-          <p:cNvPr id="6" name="Espaço Reservado para Rodapé 5"/>
+          <p:cNvPr id="6" name="Footer Placeholder 5"/>
           <p:cNvSpPr>
             <a:spLocks noGrp="1"/>
           </p:cNvSpPr>
@@ -2398,7 +2405,7 @@
       </p:sp>
       <p:sp>
         <p:nvSpPr>
-          <p:cNvPr id="7" name="Espaço Reservado para Número de Slide 6"/>
+          <p:cNvPr id="7" name="Slide Number Placeholder 6"/>
           <p:cNvSpPr>
             <a:spLocks noGrp="1"/>
           </p:cNvSpPr>
@@ -2422,7 +2429,7 @@
     </p:spTree>
     <p:extLst>
       <p:ext uri="{BB962C8B-B14F-4D97-AF65-F5344CB8AC3E}">
-        <p14:creationId xmlns:p14="http://schemas.microsoft.com/office/powerpoint/2010/main" val="2685249864"/>
+        <p14:creationId xmlns:p14="http://schemas.microsoft.com/office/powerpoint/2010/main" val="4207622549"/>
       </p:ext>
     </p:extLst>
   </p:cSld>
@@ -2456,7 +2463,7 @@
       </p:grpSpPr>
       <p:sp>
         <p:nvSpPr>
-          <p:cNvPr id="2" name="Espaço Reservado para Título 1"/>
+          <p:cNvPr id="2" name="Title Placeholder 1"/>
           <p:cNvSpPr>
             <a:spLocks noGrp="1"/>
           </p:cNvSpPr>
@@ -2466,8 +2473,8 @@
         </p:nvSpPr>
         <p:spPr>
           <a:xfrm>
-            <a:off x="838200" y="365125"/>
-            <a:ext cx="10515600" cy="1325563"/>
+            <a:off x="838200" y="186873"/>
+            <a:ext cx="10515600" cy="678431"/>
           </a:xfrm>
           <a:prstGeom prst="rect">
             <a:avLst/>
@@ -2483,13 +2490,13 @@
               <a:rPr lang="pt-BR" smtClean="0"/>
               <a:t>Clique para editar o título mestre</a:t>
             </a:r>
-            <a:endParaRPr lang="pt-BR"/>
-          </a:p>
-        </p:txBody>
-      </p:sp>
-      <p:sp>
-        <p:nvSpPr>
-          <p:cNvPr id="3" name="Espaço Reservado para Texto 2"/>
+            <a:endParaRPr lang="en-US" dirty="0"/>
+          </a:p>
+        </p:txBody>
+      </p:sp>
+      <p:sp>
+        <p:nvSpPr>
+          <p:cNvPr id="3" name="Text Placeholder 2"/>
           <p:cNvSpPr>
             <a:spLocks noGrp="1"/>
           </p:cNvSpPr>
@@ -2499,8 +2506,8 @@
         </p:nvSpPr>
         <p:spPr>
           <a:xfrm>
-            <a:off x="838200" y="1825625"/>
-            <a:ext cx="10515600" cy="4351338"/>
+            <a:off x="838200" y="934365"/>
+            <a:ext cx="10515600" cy="2227039"/>
           </a:xfrm>
           <a:prstGeom prst="rect">
             <a:avLst/>
@@ -2545,13 +2552,13 @@
               <a:rPr lang="pt-BR" smtClean="0"/>
               <a:t>Quinto nível</a:t>
             </a:r>
-            <a:endParaRPr lang="pt-BR"/>
-          </a:p>
-        </p:txBody>
-      </p:sp>
-      <p:sp>
-        <p:nvSpPr>
-          <p:cNvPr id="4" name="Espaço Reservado para Data 3"/>
+            <a:endParaRPr lang="en-US" dirty="0"/>
+          </a:p>
+        </p:txBody>
+      </p:sp>
+      <p:sp>
+        <p:nvSpPr>
+          <p:cNvPr id="4" name="Date Placeholder 3"/>
           <p:cNvSpPr>
             <a:spLocks noGrp="1"/>
           </p:cNvSpPr>
@@ -2561,8 +2568,8 @@
         </p:nvSpPr>
         <p:spPr>
           <a:xfrm>
-            <a:off x="838200" y="6356350"/>
-            <a:ext cx="2743200" cy="365125"/>
+            <a:off x="838200" y="3253216"/>
+            <a:ext cx="2743200" cy="186873"/>
           </a:xfrm>
           <a:prstGeom prst="rect">
             <a:avLst/>
@@ -2572,7 +2579,7 @@
           <a:bodyPr vert="horz" lIns="91440" tIns="45720" rIns="91440" bIns="45720" rtlCol="0" anchor="ctr"/>
           <a:lstStyle>
             <a:lvl1pPr algn="l">
-              <a:defRPr sz="1200">
+              <a:defRPr sz="614">
                 <a:solidFill>
                   <a:schemeClr val="tx1">
                     <a:tint val="75000"/>
@@ -2584,7 +2591,7 @@
           <a:p>
             <a:fld id="{0B5757C9-29C2-4B15-96BC-892616DC4387}" type="datetimeFigureOut">
               <a:rPr lang="pt-BR" smtClean="0"/>
-              <a:t>04/05/2022</a:t>
+              <a:t>08/05/2022</a:t>
             </a:fld>
             <a:endParaRPr lang="pt-BR"/>
           </a:p>
@@ -2592,7 +2599,7 @@
       </p:sp>
       <p:sp>
         <p:nvSpPr>
-          <p:cNvPr id="5" name="Espaço Reservado para Rodapé 4"/>
+          <p:cNvPr id="5" name="Footer Placeholder 4"/>
           <p:cNvSpPr>
             <a:spLocks noGrp="1"/>
           </p:cNvSpPr>
@@ -2602,8 +2609,8 @@
         </p:nvSpPr>
         <p:spPr>
           <a:xfrm>
-            <a:off x="4038600" y="6356350"/>
-            <a:ext cx="4114800" cy="365125"/>
+            <a:off x="4038600" y="3253216"/>
+            <a:ext cx="4114800" cy="186873"/>
           </a:xfrm>
           <a:prstGeom prst="rect">
             <a:avLst/>
@@ -2613,7 +2620,7 @@
           <a:bodyPr vert="horz" lIns="91440" tIns="45720" rIns="91440" bIns="45720" rtlCol="0" anchor="ctr"/>
           <a:lstStyle>
             <a:lvl1pPr algn="ctr">
-              <a:defRPr sz="1200">
+              <a:defRPr sz="614">
                 <a:solidFill>
                   <a:schemeClr val="tx1">
                     <a:tint val="75000"/>
@@ -2629,7 +2636,7 @@
       </p:sp>
       <p:sp>
         <p:nvSpPr>
-          <p:cNvPr id="6" name="Espaço Reservado para Número de Slide 5"/>
+          <p:cNvPr id="6" name="Slide Number Placeholder 5"/>
           <p:cNvSpPr>
             <a:spLocks noGrp="1"/>
           </p:cNvSpPr>
@@ -2639,8 +2646,8 @@
         </p:nvSpPr>
         <p:spPr>
           <a:xfrm>
-            <a:off x="8610600" y="6356350"/>
-            <a:ext cx="2743200" cy="365125"/>
+            <a:off x="8610600" y="3253216"/>
+            <a:ext cx="2743200" cy="186873"/>
           </a:xfrm>
           <a:prstGeom prst="rect">
             <a:avLst/>
@@ -2650,7 +2657,7 @@
           <a:bodyPr vert="horz" lIns="91440" tIns="45720" rIns="91440" bIns="45720" rtlCol="0" anchor="ctr"/>
           <a:lstStyle>
             <a:lvl1pPr algn="r">
-              <a:defRPr sz="1200">
+              <a:defRPr sz="614">
                 <a:solidFill>
                   <a:schemeClr val="tx1">
                     <a:tint val="75000"/>
@@ -2671,27 +2678,27 @@
     </p:spTree>
     <p:extLst>
       <p:ext uri="{BB962C8B-B14F-4D97-AF65-F5344CB8AC3E}">
-        <p14:creationId xmlns:p14="http://schemas.microsoft.com/office/powerpoint/2010/main" val="2066861317"/>
+        <p14:creationId xmlns:p14="http://schemas.microsoft.com/office/powerpoint/2010/main" val="2512712583"/>
       </p:ext>
     </p:extLst>
   </p:cSld>
   <p:clrMap bg1="lt1" tx1="dk1" bg2="lt2" tx2="dk2" accent1="accent1" accent2="accent2" accent3="accent3" accent4="accent4" accent5="accent5" accent6="accent6" hlink="hlink" folHlink="folHlink"/>
   <p:sldLayoutIdLst>
-    <p:sldLayoutId id="2147483649" r:id="rId1"/>
-    <p:sldLayoutId id="2147483650" r:id="rId2"/>
-    <p:sldLayoutId id="2147483651" r:id="rId3"/>
-    <p:sldLayoutId id="2147483652" r:id="rId4"/>
-    <p:sldLayoutId id="2147483653" r:id="rId5"/>
-    <p:sldLayoutId id="2147483654" r:id="rId6"/>
-    <p:sldLayoutId id="2147483655" r:id="rId7"/>
-    <p:sldLayoutId id="2147483656" r:id="rId8"/>
-    <p:sldLayoutId id="2147483657" r:id="rId9"/>
-    <p:sldLayoutId id="2147483658" r:id="rId10"/>
-    <p:sldLayoutId id="2147483659" r:id="rId11"/>
+    <p:sldLayoutId id="2147483661" r:id="rId1"/>
+    <p:sldLayoutId id="2147483662" r:id="rId2"/>
+    <p:sldLayoutId id="2147483663" r:id="rId3"/>
+    <p:sldLayoutId id="2147483664" r:id="rId4"/>
+    <p:sldLayoutId id="2147483665" r:id="rId5"/>
+    <p:sldLayoutId id="2147483666" r:id="rId6"/>
+    <p:sldLayoutId id="2147483667" r:id="rId7"/>
+    <p:sldLayoutId id="2147483668" r:id="rId8"/>
+    <p:sldLayoutId id="2147483669" r:id="rId9"/>
+    <p:sldLayoutId id="2147483670" r:id="rId10"/>
+    <p:sldLayoutId id="2147483671" r:id="rId11"/>
   </p:sldLayoutIdLst>
   <p:txStyles>
     <p:titleStyle>
-      <a:lvl1pPr algn="l" defTabSz="914400" rtl="0" eaLnBrk="1" latinLnBrk="0" hangingPunct="1">
+      <a:lvl1pPr algn="l" defTabSz="467990" rtl="0" eaLnBrk="1" latinLnBrk="0" hangingPunct="1">
         <a:lnSpc>
           <a:spcPct val="90000"/>
         </a:lnSpc>
@@ -2699,7 +2706,7 @@
           <a:spcPct val="0"/>
         </a:spcBef>
         <a:buNone/>
-        <a:defRPr sz="4400" kern="1200">
+        <a:defRPr sz="2252" kern="1200">
           <a:solidFill>
             <a:schemeClr val="tx1"/>
           </a:solidFill>
@@ -2710,16 +2717,16 @@
       </a:lvl1pPr>
     </p:titleStyle>
     <p:bodyStyle>
-      <a:lvl1pPr marL="228600" indent="-228600" algn="l" defTabSz="914400" rtl="0" eaLnBrk="1" latinLnBrk="0" hangingPunct="1">
+      <a:lvl1pPr marL="116997" indent="-116997" algn="l" defTabSz="467990" rtl="0" eaLnBrk="1" latinLnBrk="0" hangingPunct="1">
         <a:lnSpc>
           <a:spcPct val="90000"/>
         </a:lnSpc>
         <a:spcBef>
-          <a:spcPts val="1000"/>
+          <a:spcPts val="512"/>
         </a:spcBef>
         <a:buFont typeface="Arial" panose="020B0604020202020204" pitchFamily="34" charset="0"/>
         <a:buChar char="•"/>
-        <a:defRPr sz="2800" kern="1200">
+        <a:defRPr sz="1433" kern="1200">
           <a:solidFill>
             <a:schemeClr val="tx1"/>
           </a:solidFill>
@@ -2728,16 +2735,16 @@
           <a:cs typeface="+mn-cs"/>
         </a:defRPr>
       </a:lvl1pPr>
-      <a:lvl2pPr marL="685800" indent="-228600" algn="l" defTabSz="914400" rtl="0" eaLnBrk="1" latinLnBrk="0" hangingPunct="1">
+      <a:lvl2pPr marL="350992" indent="-116997" algn="l" defTabSz="467990" rtl="0" eaLnBrk="1" latinLnBrk="0" hangingPunct="1">
         <a:lnSpc>
           <a:spcPct val="90000"/>
         </a:lnSpc>
         <a:spcBef>
-          <a:spcPts val="500"/>
+          <a:spcPts val="256"/>
         </a:spcBef>
         <a:buFont typeface="Arial" panose="020B0604020202020204" pitchFamily="34" charset="0"/>
         <a:buChar char="•"/>
-        <a:defRPr sz="2400" kern="1200">
+        <a:defRPr sz="1228" kern="1200">
           <a:solidFill>
             <a:schemeClr val="tx1"/>
           </a:solidFill>
@@ -2746,16 +2753,16 @@
           <a:cs typeface="+mn-cs"/>
         </a:defRPr>
       </a:lvl2pPr>
-      <a:lvl3pPr marL="1143000" indent="-228600" algn="l" defTabSz="914400" rtl="0" eaLnBrk="1" latinLnBrk="0" hangingPunct="1">
+      <a:lvl3pPr marL="584987" indent="-116997" algn="l" defTabSz="467990" rtl="0" eaLnBrk="1" latinLnBrk="0" hangingPunct="1">
         <a:lnSpc>
           <a:spcPct val="90000"/>
         </a:lnSpc>
         <a:spcBef>
-          <a:spcPts val="500"/>
+          <a:spcPts val="256"/>
         </a:spcBef>
         <a:buFont typeface="Arial" panose="020B0604020202020204" pitchFamily="34" charset="0"/>
         <a:buChar char="•"/>
-        <a:defRPr sz="2000" kern="1200">
+        <a:defRPr sz="1024" kern="1200">
           <a:solidFill>
             <a:schemeClr val="tx1"/>
           </a:solidFill>
@@ -2764,16 +2771,16 @@
           <a:cs typeface="+mn-cs"/>
         </a:defRPr>
       </a:lvl3pPr>
-      <a:lvl4pPr marL="1600200" indent="-228600" algn="l" defTabSz="914400" rtl="0" eaLnBrk="1" latinLnBrk="0" hangingPunct="1">
+      <a:lvl4pPr marL="818982" indent="-116997" algn="l" defTabSz="467990" rtl="0" eaLnBrk="1" latinLnBrk="0" hangingPunct="1">
         <a:lnSpc>
           <a:spcPct val="90000"/>
         </a:lnSpc>
         <a:spcBef>
-          <a:spcPts val="500"/>
+          <a:spcPts val="256"/>
         </a:spcBef>
         <a:buFont typeface="Arial" panose="020B0604020202020204" pitchFamily="34" charset="0"/>
         <a:buChar char="•"/>
-        <a:defRPr sz="1800" kern="1200">
+        <a:defRPr sz="921" kern="1200">
           <a:solidFill>
             <a:schemeClr val="tx1"/>
           </a:solidFill>
@@ -2782,16 +2789,16 @@
           <a:cs typeface="+mn-cs"/>
         </a:defRPr>
       </a:lvl4pPr>
-      <a:lvl5pPr marL="2057400" indent="-228600" algn="l" defTabSz="914400" rtl="0" eaLnBrk="1" latinLnBrk="0" hangingPunct="1">
+      <a:lvl5pPr marL="1052977" indent="-116997" algn="l" defTabSz="467990" rtl="0" eaLnBrk="1" latinLnBrk="0" hangingPunct="1">
         <a:lnSpc>
           <a:spcPct val="90000"/>
         </a:lnSpc>
         <a:spcBef>
-          <a:spcPts val="500"/>
+          <a:spcPts val="256"/>
         </a:spcBef>
         <a:buFont typeface="Arial" panose="020B0604020202020204" pitchFamily="34" charset="0"/>
         <a:buChar char="•"/>
-        <a:defRPr sz="1800" kern="1200">
+        <a:defRPr sz="921" kern="1200">
           <a:solidFill>
             <a:schemeClr val="tx1"/>
           </a:solidFill>
@@ -2800,16 +2807,16 @@
           <a:cs typeface="+mn-cs"/>
         </a:defRPr>
       </a:lvl5pPr>
-      <a:lvl6pPr marL="2514600" indent="-228600" algn="l" defTabSz="914400" rtl="0" eaLnBrk="1" latinLnBrk="0" hangingPunct="1">
+      <a:lvl6pPr marL="1286972" indent="-116997" algn="l" defTabSz="467990" rtl="0" eaLnBrk="1" latinLnBrk="0" hangingPunct="1">
         <a:lnSpc>
           <a:spcPct val="90000"/>
         </a:lnSpc>
         <a:spcBef>
-          <a:spcPts val="500"/>
+          <a:spcPts val="256"/>
         </a:spcBef>
         <a:buFont typeface="Arial" panose="020B0604020202020204" pitchFamily="34" charset="0"/>
         <a:buChar char="•"/>
-        <a:defRPr sz="1800" kern="1200">
+        <a:defRPr sz="921" kern="1200">
           <a:solidFill>
             <a:schemeClr val="tx1"/>
           </a:solidFill>
@@ -2818,16 +2825,16 @@
           <a:cs typeface="+mn-cs"/>
         </a:defRPr>
       </a:lvl6pPr>
-      <a:lvl7pPr marL="2971800" indent="-228600" algn="l" defTabSz="914400" rtl="0" eaLnBrk="1" latinLnBrk="0" hangingPunct="1">
+      <a:lvl7pPr marL="1520967" indent="-116997" algn="l" defTabSz="467990" rtl="0" eaLnBrk="1" latinLnBrk="0" hangingPunct="1">
         <a:lnSpc>
           <a:spcPct val="90000"/>
         </a:lnSpc>
         <a:spcBef>
-          <a:spcPts val="500"/>
+          <a:spcPts val="256"/>
         </a:spcBef>
         <a:buFont typeface="Arial" panose="020B0604020202020204" pitchFamily="34" charset="0"/>
         <a:buChar char="•"/>
-        <a:defRPr sz="1800" kern="1200">
+        <a:defRPr sz="921" kern="1200">
           <a:solidFill>
             <a:schemeClr val="tx1"/>
           </a:solidFill>
@@ -2836,16 +2843,16 @@
           <a:cs typeface="+mn-cs"/>
         </a:defRPr>
       </a:lvl7pPr>
-      <a:lvl8pPr marL="3429000" indent="-228600" algn="l" defTabSz="914400" rtl="0" eaLnBrk="1" latinLnBrk="0" hangingPunct="1">
+      <a:lvl8pPr marL="1754962" indent="-116997" algn="l" defTabSz="467990" rtl="0" eaLnBrk="1" latinLnBrk="0" hangingPunct="1">
         <a:lnSpc>
           <a:spcPct val="90000"/>
         </a:lnSpc>
         <a:spcBef>
-          <a:spcPts val="500"/>
+          <a:spcPts val="256"/>
         </a:spcBef>
         <a:buFont typeface="Arial" panose="020B0604020202020204" pitchFamily="34" charset="0"/>
         <a:buChar char="•"/>
-        <a:defRPr sz="1800" kern="1200">
+        <a:defRPr sz="921" kern="1200">
           <a:solidFill>
             <a:schemeClr val="tx1"/>
           </a:solidFill>
@@ -2854,16 +2861,16 @@
           <a:cs typeface="+mn-cs"/>
         </a:defRPr>
       </a:lvl8pPr>
-      <a:lvl9pPr marL="3886200" indent="-228600" algn="l" defTabSz="914400" rtl="0" eaLnBrk="1" latinLnBrk="0" hangingPunct="1">
+      <a:lvl9pPr marL="1988957" indent="-116997" algn="l" defTabSz="467990" rtl="0" eaLnBrk="1" latinLnBrk="0" hangingPunct="1">
         <a:lnSpc>
           <a:spcPct val="90000"/>
         </a:lnSpc>
         <a:spcBef>
-          <a:spcPts val="500"/>
+          <a:spcPts val="256"/>
         </a:spcBef>
         <a:buFont typeface="Arial" panose="020B0604020202020204" pitchFamily="34" charset="0"/>
         <a:buChar char="•"/>
-        <a:defRPr sz="1800" kern="1200">
+        <a:defRPr sz="921" kern="1200">
           <a:solidFill>
             <a:schemeClr val="tx1"/>
           </a:solidFill>
@@ -2875,10 +2882,10 @@
     </p:bodyStyle>
     <p:otherStyle>
       <a:defPPr>
-        <a:defRPr lang="pt-BR"/>
+        <a:defRPr lang="en-US"/>
       </a:defPPr>
-      <a:lvl1pPr marL="0" algn="l" defTabSz="914400" rtl="0" eaLnBrk="1" latinLnBrk="0" hangingPunct="1">
-        <a:defRPr sz="1800" kern="1200">
+      <a:lvl1pPr marL="0" algn="l" defTabSz="467990" rtl="0" eaLnBrk="1" latinLnBrk="0" hangingPunct="1">
+        <a:defRPr sz="921" kern="1200">
           <a:solidFill>
             <a:schemeClr val="tx1"/>
           </a:solidFill>
@@ -2887,8 +2894,8 @@
           <a:cs typeface="+mn-cs"/>
         </a:defRPr>
       </a:lvl1pPr>
-      <a:lvl2pPr marL="457200" algn="l" defTabSz="914400" rtl="0" eaLnBrk="1" latinLnBrk="0" hangingPunct="1">
-        <a:defRPr sz="1800" kern="1200">
+      <a:lvl2pPr marL="233995" algn="l" defTabSz="467990" rtl="0" eaLnBrk="1" latinLnBrk="0" hangingPunct="1">
+        <a:defRPr sz="921" kern="1200">
           <a:solidFill>
             <a:schemeClr val="tx1"/>
           </a:solidFill>
@@ -2897,8 +2904,8 @@
           <a:cs typeface="+mn-cs"/>
         </a:defRPr>
       </a:lvl2pPr>
-      <a:lvl3pPr marL="914400" algn="l" defTabSz="914400" rtl="0" eaLnBrk="1" latinLnBrk="0" hangingPunct="1">
-        <a:defRPr sz="1800" kern="1200">
+      <a:lvl3pPr marL="467990" algn="l" defTabSz="467990" rtl="0" eaLnBrk="1" latinLnBrk="0" hangingPunct="1">
+        <a:defRPr sz="921" kern="1200">
           <a:solidFill>
             <a:schemeClr val="tx1"/>
           </a:solidFill>
@@ -2907,8 +2914,8 @@
           <a:cs typeface="+mn-cs"/>
         </a:defRPr>
       </a:lvl3pPr>
-      <a:lvl4pPr marL="1371600" algn="l" defTabSz="914400" rtl="0" eaLnBrk="1" latinLnBrk="0" hangingPunct="1">
-        <a:defRPr sz="1800" kern="1200">
+      <a:lvl4pPr marL="701985" algn="l" defTabSz="467990" rtl="0" eaLnBrk="1" latinLnBrk="0" hangingPunct="1">
+        <a:defRPr sz="921" kern="1200">
           <a:solidFill>
             <a:schemeClr val="tx1"/>
           </a:solidFill>
@@ -2917,8 +2924,8 @@
           <a:cs typeface="+mn-cs"/>
         </a:defRPr>
       </a:lvl4pPr>
-      <a:lvl5pPr marL="1828800" algn="l" defTabSz="914400" rtl="0" eaLnBrk="1" latinLnBrk="0" hangingPunct="1">
-        <a:defRPr sz="1800" kern="1200">
+      <a:lvl5pPr marL="935980" algn="l" defTabSz="467990" rtl="0" eaLnBrk="1" latinLnBrk="0" hangingPunct="1">
+        <a:defRPr sz="921" kern="1200">
           <a:solidFill>
             <a:schemeClr val="tx1"/>
           </a:solidFill>
@@ -2927,8 +2934,8 @@
           <a:cs typeface="+mn-cs"/>
         </a:defRPr>
       </a:lvl5pPr>
-      <a:lvl6pPr marL="2286000" algn="l" defTabSz="914400" rtl="0" eaLnBrk="1" latinLnBrk="0" hangingPunct="1">
-        <a:defRPr sz="1800" kern="1200">
+      <a:lvl6pPr marL="1169975" algn="l" defTabSz="467990" rtl="0" eaLnBrk="1" latinLnBrk="0" hangingPunct="1">
+        <a:defRPr sz="921" kern="1200">
           <a:solidFill>
             <a:schemeClr val="tx1"/>
           </a:solidFill>
@@ -2937,8 +2944,8 @@
           <a:cs typeface="+mn-cs"/>
         </a:defRPr>
       </a:lvl6pPr>
-      <a:lvl7pPr marL="2743200" algn="l" defTabSz="914400" rtl="0" eaLnBrk="1" latinLnBrk="0" hangingPunct="1">
-        <a:defRPr sz="1800" kern="1200">
+      <a:lvl7pPr marL="1403970" algn="l" defTabSz="467990" rtl="0" eaLnBrk="1" latinLnBrk="0" hangingPunct="1">
+        <a:defRPr sz="921" kern="1200">
           <a:solidFill>
             <a:schemeClr val="tx1"/>
           </a:solidFill>
@@ -2947,8 +2954,8 @@
           <a:cs typeface="+mn-cs"/>
         </a:defRPr>
       </a:lvl7pPr>
-      <a:lvl8pPr marL="3200400" algn="l" defTabSz="914400" rtl="0" eaLnBrk="1" latinLnBrk="0" hangingPunct="1">
-        <a:defRPr sz="1800" kern="1200">
+      <a:lvl8pPr marL="1637965" algn="l" defTabSz="467990" rtl="0" eaLnBrk="1" latinLnBrk="0" hangingPunct="1">
+        <a:defRPr sz="921" kern="1200">
           <a:solidFill>
             <a:schemeClr val="tx1"/>
           </a:solidFill>
@@ -2957,8 +2964,8 @@
           <a:cs typeface="+mn-cs"/>
         </a:defRPr>
       </a:lvl8pPr>
-      <a:lvl9pPr marL="3657600" algn="l" defTabSz="914400" rtl="0" eaLnBrk="1" latinLnBrk="0" hangingPunct="1">
-        <a:defRPr sz="1800" kern="1200">
+      <a:lvl9pPr marL="1871960" algn="l" defTabSz="467990" rtl="0" eaLnBrk="1" latinLnBrk="0" hangingPunct="1">
+        <a:defRPr sz="921" kern="1200">
           <a:solidFill>
             <a:schemeClr val="tx1"/>
           </a:solidFill>
@@ -3011,7 +3018,7 @@
         </p:blipFill>
         <p:spPr>
           <a:xfrm>
-            <a:off x="0" y="0"/>
+            <a:off x="0" y="-1674019"/>
             <a:ext cx="12192000" cy="6858000"/>
           </a:xfrm>
           <a:prstGeom prst="rect">
@@ -3027,7 +3034,7 @@
         </p:nvSpPr>
         <p:spPr>
           <a:xfrm>
-            <a:off x="0" y="0"/>
+            <a:off x="0" y="-1674019"/>
             <a:ext cx="12192000" cy="6858000"/>
           </a:xfrm>
           <a:prstGeom prst="rect">
@@ -3107,7 +3114,7 @@
         </p:blipFill>
         <p:spPr>
           <a:xfrm>
-            <a:off x="6378223" y="1094704"/>
+            <a:off x="6378223" y="-579315"/>
             <a:ext cx="4381040" cy="6858000"/>
           </a:xfrm>
           <a:prstGeom prst="rect">
@@ -3123,7 +3130,7 @@
         </p:nvSpPr>
         <p:spPr>
           <a:xfrm>
-            <a:off x="798491" y="1300766"/>
+            <a:off x="798492" y="-373253"/>
             <a:ext cx="5129161" cy="1569660"/>
           </a:xfrm>
           <a:prstGeom prst="rect">
@@ -3138,7 +3145,7 @@
           <a:lstStyle/>
           <a:p>
             <a:r>
-              <a:rPr lang="pt-BR" sz="4800" b="1" dirty="0" smtClean="0">
+              <a:rPr lang="pt-BR" sz="4800" b="1" dirty="0">
                 <a:solidFill>
                   <a:schemeClr val="bg1"/>
                 </a:solidFill>
@@ -3148,7 +3155,7 @@
           </a:p>
           <a:p>
             <a:r>
-              <a:rPr lang="pt-BR" sz="4800" b="1" dirty="0" smtClean="0">
+              <a:rPr lang="pt-BR" sz="4800" b="1" dirty="0">
                 <a:solidFill>
                   <a:schemeClr val="bg1"/>
                 </a:solidFill>
@@ -3223,7 +3230,7 @@
         </p:blipFill>
         <p:spPr bwMode="auto">
           <a:xfrm>
-            <a:off x="-1" y="-16384"/>
+            <a:off x="-1" y="-1690403"/>
             <a:ext cx="12305625" cy="6921914"/>
           </a:xfrm>
           <a:prstGeom prst="rect">
@@ -3249,7 +3256,7 @@
         </p:nvSpPr>
         <p:spPr>
           <a:xfrm>
-            <a:off x="-51517" y="0"/>
+            <a:off x="-51517" y="-1674019"/>
             <a:ext cx="12357141" cy="6905530"/>
           </a:xfrm>
           <a:prstGeom prst="rect">
@@ -3310,7 +3317,7 @@
         </p:nvSpPr>
         <p:spPr>
           <a:xfrm>
-            <a:off x="-1139685" y="637504"/>
+            <a:off x="-1139685" y="-1036515"/>
             <a:ext cx="914400" cy="914400"/>
           </a:xfrm>
           <a:prstGeom prst="rect">
@@ -3353,7 +3360,7 @@
         </p:nvSpPr>
         <p:spPr>
           <a:xfrm>
-            <a:off x="-1139685" y="1956026"/>
+            <a:off x="-1139685" y="282007"/>
             <a:ext cx="914400" cy="914400"/>
           </a:xfrm>
           <a:prstGeom prst="rect">
@@ -3396,7 +3403,7 @@
         </p:nvSpPr>
         <p:spPr>
           <a:xfrm>
-            <a:off x="-1191201" y="3274548"/>
+            <a:off x="-1191201" y="1600529"/>
             <a:ext cx="914400" cy="914400"/>
           </a:xfrm>
           <a:prstGeom prst="rect">
@@ -3439,7 +3446,7 @@
         </p:nvSpPr>
         <p:spPr>
           <a:xfrm>
-            <a:off x="-1139685" y="4523704"/>
+            <a:off x="-1139685" y="2849685"/>
             <a:ext cx="914400" cy="914400"/>
           </a:xfrm>
           <a:prstGeom prst="rect">
@@ -3484,7 +3491,7 @@
         </p:nvSpPr>
         <p:spPr bwMode="auto">
           <a:xfrm>
-            <a:off x="307975" y="7937"/>
+            <a:off x="307975" y="-1666082"/>
             <a:ext cx="304800" cy="304801"/>
           </a:xfrm>
           <a:prstGeom prst="rect">
@@ -3517,6 +3524,1056 @@
     <p:extLst>
       <p:ext uri="{BB962C8B-B14F-4D97-AF65-F5344CB8AC3E}">
         <p14:creationId xmlns:p14="http://schemas.microsoft.com/office/powerpoint/2010/main" val="788521565"/>
+      </p:ext>
+    </p:extLst>
+  </p:cSld>
+  <p:clrMapOvr>
+    <a:masterClrMapping/>
+  </p:clrMapOvr>
+  <p:timing>
+    <p:tnLst>
+      <p:par>
+        <p:cTn id="1" dur="indefinite" restart="never" nodeType="tmRoot"/>
+      </p:par>
+    </p:tnLst>
+  </p:timing>
+</p:sld>
+</file>
+
+<file path=ppt/slides/slide11.xml><?xml version="1.0" encoding="utf-8"?>
+<p:sld xmlns:a="http://schemas.openxmlformats.org/drawingml/2006/main" xmlns:r="http://schemas.openxmlformats.org/officeDocument/2006/relationships" xmlns:p="http://schemas.openxmlformats.org/presentationml/2006/main">
+  <p:cSld>
+    <p:spTree>
+      <p:nvGrpSpPr>
+        <p:cNvPr id="1" name=""/>
+        <p:cNvGrpSpPr/>
+        <p:nvPr/>
+      </p:nvGrpSpPr>
+      <p:grpSpPr>
+        <a:xfrm>
+          <a:off x="0" y="0"/>
+          <a:ext cx="0" cy="0"/>
+          <a:chOff x="0" y="0"/>
+          <a:chExt cx="0" cy="0"/>
+        </a:xfrm>
+      </p:grpSpPr>
+      <p:pic>
+        <p:nvPicPr>
+          <p:cNvPr id="3078" name="Picture 6" descr="Minecraft Dungeons gets cross-play this month | PCGamesN"/>
+          <p:cNvPicPr>
+            <a:picLocks noChangeAspect="1" noChangeArrowheads="1"/>
+          </p:cNvPicPr>
+          <p:nvPr/>
+        </p:nvPicPr>
+        <p:blipFill>
+          <a:blip r:embed="rId2">
+            <a:extLst>
+              <a:ext uri="{28A0092B-C50C-407E-A947-70E740481C1C}">
+                <a14:useLocalDpi xmlns:a14="http://schemas.microsoft.com/office/drawing/2010/main" val="0"/>
+              </a:ext>
+            </a:extLst>
+          </a:blip>
+          <a:srcRect/>
+          <a:stretch>
+            <a:fillRect/>
+          </a:stretch>
+        </p:blipFill>
+        <p:spPr bwMode="auto">
+          <a:xfrm>
+            <a:off x="1" y="-1708592"/>
+            <a:ext cx="12337961" cy="6940103"/>
+          </a:xfrm>
+          <a:prstGeom prst="rect">
+            <a:avLst/>
+          </a:prstGeom>
+          <a:noFill/>
+          <a:extLst>
+            <a:ext uri="{909E8E84-426E-40DD-AFC4-6F175D3DCCD1}">
+              <a14:hiddenFill xmlns:a14="http://schemas.microsoft.com/office/drawing/2010/main">
+                <a:solidFill>
+                  <a:srgbClr val="FFFFFF"/>
+                </a:solidFill>
+              </a14:hiddenFill>
+            </a:ext>
+          </a:extLst>
+        </p:spPr>
+      </p:pic>
+      <p:sp>
+        <p:nvSpPr>
+          <p:cNvPr id="5" name="Retângulo 4"/>
+          <p:cNvSpPr/>
+          <p:nvPr/>
+        </p:nvSpPr>
+        <p:spPr>
+          <a:xfrm>
+            <a:off x="1" y="-1710531"/>
+            <a:ext cx="12337960" cy="6942042"/>
+          </a:xfrm>
+          <a:prstGeom prst="rect">
+            <a:avLst/>
+          </a:prstGeom>
+          <a:gradFill flip="none" rotWithShape="1">
+            <a:gsLst>
+              <a:gs pos="0">
+                <a:srgbClr val="003300">
+                  <a:alpha val="80000"/>
+                </a:srgbClr>
+              </a:gs>
+              <a:gs pos="100000">
+                <a:srgbClr val="003300">
+                  <a:alpha val="80000"/>
+                </a:srgbClr>
+              </a:gs>
+            </a:gsLst>
+            <a:path path="circle">
+              <a:fillToRect l="100000" t="100000"/>
+            </a:path>
+            <a:tileRect r="-100000" b="-100000"/>
+          </a:gradFill>
+          <a:ln>
+            <a:noFill/>
+          </a:ln>
+        </p:spPr>
+        <p:style>
+          <a:lnRef idx="2">
+            <a:schemeClr val="accent1">
+              <a:shade val="50000"/>
+            </a:schemeClr>
+          </a:lnRef>
+          <a:fillRef idx="1">
+            <a:schemeClr val="accent1"/>
+          </a:fillRef>
+          <a:effectRef idx="0">
+            <a:schemeClr val="accent1"/>
+          </a:effectRef>
+          <a:fontRef idx="minor">
+            <a:schemeClr val="lt1"/>
+          </a:fontRef>
+        </p:style>
+        <p:txBody>
+          <a:bodyPr rtlCol="0" anchor="ctr"/>
+          <a:lstStyle/>
+          <a:p>
+            <a:pPr algn="ctr"/>
+            <a:endParaRPr lang="pt-BR"/>
+          </a:p>
+        </p:txBody>
+      </p:sp>
+      <p:sp>
+        <p:nvSpPr>
+          <p:cNvPr id="2" name="Retângulo 1"/>
+          <p:cNvSpPr/>
+          <p:nvPr/>
+        </p:nvSpPr>
+        <p:spPr>
+          <a:xfrm>
+            <a:off x="-1139685" y="-1036515"/>
+            <a:ext cx="914400" cy="914400"/>
+          </a:xfrm>
+          <a:prstGeom prst="rect">
+            <a:avLst/>
+          </a:prstGeom>
+          <a:solidFill>
+            <a:srgbClr val="008000"/>
+          </a:solidFill>
+        </p:spPr>
+        <p:style>
+          <a:lnRef idx="2">
+            <a:schemeClr val="accent1">
+              <a:shade val="50000"/>
+            </a:schemeClr>
+          </a:lnRef>
+          <a:fillRef idx="1">
+            <a:schemeClr val="accent1"/>
+          </a:fillRef>
+          <a:effectRef idx="0">
+            <a:schemeClr val="accent1"/>
+          </a:effectRef>
+          <a:fontRef idx="minor">
+            <a:schemeClr val="lt1"/>
+          </a:fontRef>
+        </p:style>
+        <p:txBody>
+          <a:bodyPr rtlCol="0" anchor="ctr"/>
+          <a:lstStyle/>
+          <a:p>
+            <a:pPr algn="ctr"/>
+            <a:endParaRPr lang="pt-BR"/>
+          </a:p>
+        </p:txBody>
+      </p:sp>
+      <p:sp>
+        <p:nvSpPr>
+          <p:cNvPr id="8" name="Retângulo 7"/>
+          <p:cNvSpPr/>
+          <p:nvPr/>
+        </p:nvSpPr>
+        <p:spPr>
+          <a:xfrm>
+            <a:off x="-1139685" y="282007"/>
+            <a:ext cx="914400" cy="914400"/>
+          </a:xfrm>
+          <a:prstGeom prst="rect">
+            <a:avLst/>
+          </a:prstGeom>
+          <a:solidFill>
+            <a:srgbClr val="003300"/>
+          </a:solidFill>
+        </p:spPr>
+        <p:style>
+          <a:lnRef idx="2">
+            <a:schemeClr val="accent1">
+              <a:shade val="50000"/>
+            </a:schemeClr>
+          </a:lnRef>
+          <a:fillRef idx="1">
+            <a:schemeClr val="accent1"/>
+          </a:fillRef>
+          <a:effectRef idx="0">
+            <a:schemeClr val="accent1"/>
+          </a:effectRef>
+          <a:fontRef idx="minor">
+            <a:schemeClr val="lt1"/>
+          </a:fontRef>
+        </p:style>
+        <p:txBody>
+          <a:bodyPr rtlCol="0" anchor="ctr"/>
+          <a:lstStyle/>
+          <a:p>
+            <a:pPr algn="ctr"/>
+            <a:endParaRPr lang="pt-BR"/>
+          </a:p>
+        </p:txBody>
+      </p:sp>
+      <p:sp>
+        <p:nvSpPr>
+          <p:cNvPr id="9" name="Retângulo 8"/>
+          <p:cNvSpPr/>
+          <p:nvPr/>
+        </p:nvSpPr>
+        <p:spPr>
+          <a:xfrm>
+            <a:off x="-1191201" y="1600529"/>
+            <a:ext cx="914400" cy="914400"/>
+          </a:xfrm>
+          <a:prstGeom prst="rect">
+            <a:avLst/>
+          </a:prstGeom>
+          <a:solidFill>
+            <a:srgbClr val="112814"/>
+          </a:solidFill>
+        </p:spPr>
+        <p:style>
+          <a:lnRef idx="2">
+            <a:schemeClr val="accent1">
+              <a:shade val="50000"/>
+            </a:schemeClr>
+          </a:lnRef>
+          <a:fillRef idx="1">
+            <a:schemeClr val="accent1"/>
+          </a:fillRef>
+          <a:effectRef idx="0">
+            <a:schemeClr val="accent1"/>
+          </a:effectRef>
+          <a:fontRef idx="minor">
+            <a:schemeClr val="lt1"/>
+          </a:fontRef>
+        </p:style>
+        <p:txBody>
+          <a:bodyPr rtlCol="0" anchor="ctr"/>
+          <a:lstStyle/>
+          <a:p>
+            <a:pPr algn="ctr"/>
+            <a:endParaRPr lang="pt-BR"/>
+          </a:p>
+        </p:txBody>
+      </p:sp>
+      <p:sp>
+        <p:nvSpPr>
+          <p:cNvPr id="10" name="Retângulo 9"/>
+          <p:cNvSpPr/>
+          <p:nvPr/>
+        </p:nvSpPr>
+        <p:spPr>
+          <a:xfrm>
+            <a:off x="-1139685" y="2849685"/>
+            <a:ext cx="914400" cy="914400"/>
+          </a:xfrm>
+          <a:prstGeom prst="rect">
+            <a:avLst/>
+          </a:prstGeom>
+          <a:solidFill>
+            <a:srgbClr val="B31110"/>
+          </a:solidFill>
+        </p:spPr>
+        <p:style>
+          <a:lnRef idx="2">
+            <a:schemeClr val="accent1">
+              <a:shade val="50000"/>
+            </a:schemeClr>
+          </a:lnRef>
+          <a:fillRef idx="1">
+            <a:schemeClr val="accent1"/>
+          </a:fillRef>
+          <a:effectRef idx="0">
+            <a:schemeClr val="accent1"/>
+          </a:effectRef>
+          <a:fontRef idx="minor">
+            <a:schemeClr val="lt1"/>
+          </a:fontRef>
+        </p:style>
+        <p:txBody>
+          <a:bodyPr rtlCol="0" anchor="ctr"/>
+          <a:lstStyle/>
+          <a:p>
+            <a:pPr algn="ctr"/>
+            <a:endParaRPr lang="pt-BR"/>
+          </a:p>
+        </p:txBody>
+      </p:sp>
+      <p:sp>
+        <p:nvSpPr>
+          <p:cNvPr id="4" name="AutoShape 4" descr="8K Minecraft Wallpapers - Wallpaper Cave"/>
+          <p:cNvSpPr>
+            <a:spLocks noChangeAspect="1" noChangeArrowheads="1"/>
+          </p:cNvSpPr>
+          <p:nvPr/>
+        </p:nvSpPr>
+        <p:spPr bwMode="auto">
+          <a:xfrm>
+            <a:off x="307975" y="-1666082"/>
+            <a:ext cx="304800" cy="304801"/>
+          </a:xfrm>
+          <a:prstGeom prst="rect">
+            <a:avLst/>
+          </a:prstGeom>
+          <a:noFill/>
+          <a:extLst>
+            <a:ext uri="{909E8E84-426E-40DD-AFC4-6F175D3DCCD1}">
+              <a14:hiddenFill xmlns:a14="http://schemas.microsoft.com/office/drawing/2010/main">
+                <a:solidFill>
+                  <a:srgbClr val="FFFFFF"/>
+                </a:solidFill>
+              </a14:hiddenFill>
+            </a:ext>
+          </a:extLst>
+        </p:spPr>
+        <p:txBody>
+          <a:bodyPr vert="horz" wrap="square" lIns="91440" tIns="45720" rIns="91440" bIns="45720" numCol="1" anchor="t" anchorCtr="0" compatLnSpc="1">
+            <a:prstTxWarp prst="textNoShape">
+              <a:avLst/>
+            </a:prstTxWarp>
+          </a:bodyPr>
+          <a:lstStyle/>
+          <a:p>
+            <a:endParaRPr lang="pt-BR"/>
+          </a:p>
+        </p:txBody>
+      </p:sp>
+    </p:spTree>
+    <p:extLst>
+      <p:ext uri="{BB962C8B-B14F-4D97-AF65-F5344CB8AC3E}">
+        <p14:creationId xmlns:p14="http://schemas.microsoft.com/office/powerpoint/2010/main" val="2416817038"/>
+      </p:ext>
+    </p:extLst>
+  </p:cSld>
+  <p:clrMapOvr>
+    <a:masterClrMapping/>
+  </p:clrMapOvr>
+  <p:timing>
+    <p:tnLst>
+      <p:par>
+        <p:cTn id="1" dur="indefinite" restart="never" nodeType="tmRoot"/>
+      </p:par>
+    </p:tnLst>
+  </p:timing>
+</p:sld>
+</file>
+
+<file path=ppt/slides/slide12.xml><?xml version="1.0" encoding="utf-8"?>
+<p:sld xmlns:a="http://schemas.openxmlformats.org/drawingml/2006/main" xmlns:r="http://schemas.openxmlformats.org/officeDocument/2006/relationships" xmlns:p="http://schemas.openxmlformats.org/presentationml/2006/main">
+  <p:cSld>
+    <p:spTree>
+      <p:nvGrpSpPr>
+        <p:cNvPr id="1" name=""/>
+        <p:cNvGrpSpPr/>
+        <p:nvPr/>
+      </p:nvGrpSpPr>
+      <p:grpSpPr>
+        <a:xfrm>
+          <a:off x="0" y="0"/>
+          <a:ext cx="0" cy="0"/>
+          <a:chOff x="0" y="0"/>
+          <a:chExt cx="0" cy="0"/>
+        </a:xfrm>
+      </p:grpSpPr>
+      <p:pic>
+        <p:nvPicPr>
+          <p:cNvPr id="3078" name="Picture 6"/>
+          <p:cNvPicPr>
+            <a:picLocks noChangeAspect="1" noChangeArrowheads="1"/>
+          </p:cNvPicPr>
+          <p:nvPr/>
+        </p:nvPicPr>
+        <p:blipFill>
+          <a:blip r:embed="rId2">
+            <a:extLst>
+              <a:ext uri="{28A0092B-C50C-407E-A947-70E740481C1C}">
+                <a14:useLocalDpi xmlns:a14="http://schemas.microsoft.com/office/drawing/2010/main" val="0"/>
+              </a:ext>
+            </a:extLst>
+          </a:blip>
+          <a:stretch>
+            <a:fillRect/>
+          </a:stretch>
+        </p:blipFill>
+        <p:spPr bwMode="auto">
+          <a:xfrm>
+            <a:off x="0" y="-1708592"/>
+            <a:ext cx="12337960" cy="6940103"/>
+          </a:xfrm>
+          <a:prstGeom prst="rect">
+            <a:avLst/>
+          </a:prstGeom>
+          <a:noFill/>
+          <a:extLst>
+            <a:ext uri="{909E8E84-426E-40DD-AFC4-6F175D3DCCD1}">
+              <a14:hiddenFill xmlns:a14="http://schemas.microsoft.com/office/drawing/2010/main">
+                <a:solidFill>
+                  <a:srgbClr val="FFFFFF"/>
+                </a:solidFill>
+              </a14:hiddenFill>
+            </a:ext>
+          </a:extLst>
+        </p:spPr>
+      </p:pic>
+      <p:sp>
+        <p:nvSpPr>
+          <p:cNvPr id="5" name="Retângulo 4"/>
+          <p:cNvSpPr/>
+          <p:nvPr/>
+        </p:nvSpPr>
+        <p:spPr>
+          <a:xfrm>
+            <a:off x="1" y="-1710531"/>
+            <a:ext cx="12337960" cy="6942042"/>
+          </a:xfrm>
+          <a:prstGeom prst="rect">
+            <a:avLst/>
+          </a:prstGeom>
+          <a:gradFill flip="none" rotWithShape="1">
+            <a:gsLst>
+              <a:gs pos="100000">
+                <a:srgbClr val="003300"/>
+              </a:gs>
+              <a:gs pos="0">
+                <a:srgbClr val="003300"/>
+              </a:gs>
+              <a:gs pos="54000">
+                <a:srgbClr val="003300">
+                  <a:alpha val="90000"/>
+                </a:srgbClr>
+              </a:gs>
+            </a:gsLst>
+            <a:path path="rect">
+              <a:fillToRect l="100000" t="100000"/>
+            </a:path>
+            <a:tileRect r="-100000" b="-100000"/>
+          </a:gradFill>
+          <a:ln>
+            <a:noFill/>
+          </a:ln>
+        </p:spPr>
+        <p:style>
+          <a:lnRef idx="2">
+            <a:schemeClr val="accent1">
+              <a:shade val="50000"/>
+            </a:schemeClr>
+          </a:lnRef>
+          <a:fillRef idx="1">
+            <a:schemeClr val="accent1"/>
+          </a:fillRef>
+          <a:effectRef idx="0">
+            <a:schemeClr val="accent1"/>
+          </a:effectRef>
+          <a:fontRef idx="minor">
+            <a:schemeClr val="lt1"/>
+          </a:fontRef>
+        </p:style>
+        <p:txBody>
+          <a:bodyPr rtlCol="0" anchor="ctr"/>
+          <a:lstStyle/>
+          <a:p>
+            <a:pPr algn="ctr"/>
+            <a:endParaRPr lang="pt-BR"/>
+          </a:p>
+        </p:txBody>
+      </p:sp>
+      <p:sp>
+        <p:nvSpPr>
+          <p:cNvPr id="2" name="Retângulo 1"/>
+          <p:cNvSpPr/>
+          <p:nvPr/>
+        </p:nvSpPr>
+        <p:spPr>
+          <a:xfrm>
+            <a:off x="-1139685" y="-1036515"/>
+            <a:ext cx="914400" cy="914400"/>
+          </a:xfrm>
+          <a:prstGeom prst="rect">
+            <a:avLst/>
+          </a:prstGeom>
+          <a:solidFill>
+            <a:srgbClr val="008000"/>
+          </a:solidFill>
+        </p:spPr>
+        <p:style>
+          <a:lnRef idx="2">
+            <a:schemeClr val="accent1">
+              <a:shade val="50000"/>
+            </a:schemeClr>
+          </a:lnRef>
+          <a:fillRef idx="1">
+            <a:schemeClr val="accent1"/>
+          </a:fillRef>
+          <a:effectRef idx="0">
+            <a:schemeClr val="accent1"/>
+          </a:effectRef>
+          <a:fontRef idx="minor">
+            <a:schemeClr val="lt1"/>
+          </a:fontRef>
+        </p:style>
+        <p:txBody>
+          <a:bodyPr rtlCol="0" anchor="ctr"/>
+          <a:lstStyle/>
+          <a:p>
+            <a:pPr algn="ctr"/>
+            <a:endParaRPr lang="pt-BR"/>
+          </a:p>
+        </p:txBody>
+      </p:sp>
+      <p:sp>
+        <p:nvSpPr>
+          <p:cNvPr id="8" name="Retângulo 7"/>
+          <p:cNvSpPr/>
+          <p:nvPr/>
+        </p:nvSpPr>
+        <p:spPr>
+          <a:xfrm>
+            <a:off x="-1139685" y="282007"/>
+            <a:ext cx="914400" cy="914400"/>
+          </a:xfrm>
+          <a:prstGeom prst="rect">
+            <a:avLst/>
+          </a:prstGeom>
+          <a:solidFill>
+            <a:srgbClr val="003300"/>
+          </a:solidFill>
+        </p:spPr>
+        <p:style>
+          <a:lnRef idx="2">
+            <a:schemeClr val="accent1">
+              <a:shade val="50000"/>
+            </a:schemeClr>
+          </a:lnRef>
+          <a:fillRef idx="1">
+            <a:schemeClr val="accent1"/>
+          </a:fillRef>
+          <a:effectRef idx="0">
+            <a:schemeClr val="accent1"/>
+          </a:effectRef>
+          <a:fontRef idx="minor">
+            <a:schemeClr val="lt1"/>
+          </a:fontRef>
+        </p:style>
+        <p:txBody>
+          <a:bodyPr rtlCol="0" anchor="ctr"/>
+          <a:lstStyle/>
+          <a:p>
+            <a:pPr algn="ctr"/>
+            <a:endParaRPr lang="pt-BR"/>
+          </a:p>
+        </p:txBody>
+      </p:sp>
+      <p:sp>
+        <p:nvSpPr>
+          <p:cNvPr id="9" name="Retângulo 8"/>
+          <p:cNvSpPr/>
+          <p:nvPr/>
+        </p:nvSpPr>
+        <p:spPr>
+          <a:xfrm>
+            <a:off x="-1191201" y="1600529"/>
+            <a:ext cx="914400" cy="914400"/>
+          </a:xfrm>
+          <a:prstGeom prst="rect">
+            <a:avLst/>
+          </a:prstGeom>
+          <a:solidFill>
+            <a:srgbClr val="112814"/>
+          </a:solidFill>
+        </p:spPr>
+        <p:style>
+          <a:lnRef idx="2">
+            <a:schemeClr val="accent1">
+              <a:shade val="50000"/>
+            </a:schemeClr>
+          </a:lnRef>
+          <a:fillRef idx="1">
+            <a:schemeClr val="accent1"/>
+          </a:fillRef>
+          <a:effectRef idx="0">
+            <a:schemeClr val="accent1"/>
+          </a:effectRef>
+          <a:fontRef idx="minor">
+            <a:schemeClr val="lt1"/>
+          </a:fontRef>
+        </p:style>
+        <p:txBody>
+          <a:bodyPr rtlCol="0" anchor="ctr"/>
+          <a:lstStyle/>
+          <a:p>
+            <a:pPr algn="ctr"/>
+            <a:endParaRPr lang="pt-BR"/>
+          </a:p>
+        </p:txBody>
+      </p:sp>
+      <p:sp>
+        <p:nvSpPr>
+          <p:cNvPr id="10" name="Retângulo 9"/>
+          <p:cNvSpPr/>
+          <p:nvPr/>
+        </p:nvSpPr>
+        <p:spPr>
+          <a:xfrm>
+            <a:off x="-1139685" y="2849685"/>
+            <a:ext cx="914400" cy="914400"/>
+          </a:xfrm>
+          <a:prstGeom prst="rect">
+            <a:avLst/>
+          </a:prstGeom>
+          <a:solidFill>
+            <a:srgbClr val="B31110"/>
+          </a:solidFill>
+        </p:spPr>
+        <p:style>
+          <a:lnRef idx="2">
+            <a:schemeClr val="accent1">
+              <a:shade val="50000"/>
+            </a:schemeClr>
+          </a:lnRef>
+          <a:fillRef idx="1">
+            <a:schemeClr val="accent1"/>
+          </a:fillRef>
+          <a:effectRef idx="0">
+            <a:schemeClr val="accent1"/>
+          </a:effectRef>
+          <a:fontRef idx="minor">
+            <a:schemeClr val="lt1"/>
+          </a:fontRef>
+        </p:style>
+        <p:txBody>
+          <a:bodyPr rtlCol="0" anchor="ctr"/>
+          <a:lstStyle/>
+          <a:p>
+            <a:pPr algn="ctr"/>
+            <a:endParaRPr lang="pt-BR"/>
+          </a:p>
+        </p:txBody>
+      </p:sp>
+      <p:sp>
+        <p:nvSpPr>
+          <p:cNvPr id="4" name="AutoShape 4" descr="8K Minecraft Wallpapers - Wallpaper Cave"/>
+          <p:cNvSpPr>
+            <a:spLocks noChangeAspect="1" noChangeArrowheads="1"/>
+          </p:cNvSpPr>
+          <p:nvPr/>
+        </p:nvSpPr>
+        <p:spPr bwMode="auto">
+          <a:xfrm>
+            <a:off x="307975" y="-1666082"/>
+            <a:ext cx="304800" cy="304801"/>
+          </a:xfrm>
+          <a:prstGeom prst="rect">
+            <a:avLst/>
+          </a:prstGeom>
+          <a:noFill/>
+          <a:extLst>
+            <a:ext uri="{909E8E84-426E-40DD-AFC4-6F175D3DCCD1}">
+              <a14:hiddenFill xmlns:a14="http://schemas.microsoft.com/office/drawing/2010/main">
+                <a:solidFill>
+                  <a:srgbClr val="FFFFFF"/>
+                </a:solidFill>
+              </a14:hiddenFill>
+            </a:ext>
+          </a:extLst>
+        </p:spPr>
+        <p:txBody>
+          <a:bodyPr vert="horz" wrap="square" lIns="91440" tIns="45720" rIns="91440" bIns="45720" numCol="1" anchor="t" anchorCtr="0" compatLnSpc="1">
+            <a:prstTxWarp prst="textNoShape">
+              <a:avLst/>
+            </a:prstTxWarp>
+          </a:bodyPr>
+          <a:lstStyle/>
+          <a:p>
+            <a:endParaRPr lang="pt-BR"/>
+          </a:p>
+        </p:txBody>
+      </p:sp>
+    </p:spTree>
+    <p:extLst>
+      <p:ext uri="{BB962C8B-B14F-4D97-AF65-F5344CB8AC3E}">
+        <p14:creationId xmlns:p14="http://schemas.microsoft.com/office/powerpoint/2010/main" val="999595212"/>
+      </p:ext>
+    </p:extLst>
+  </p:cSld>
+  <p:clrMapOvr>
+    <a:masterClrMapping/>
+  </p:clrMapOvr>
+  <p:timing>
+    <p:tnLst>
+      <p:par>
+        <p:cTn id="1" dur="indefinite" restart="never" nodeType="tmRoot"/>
+      </p:par>
+    </p:tnLst>
+  </p:timing>
+</p:sld>
+</file>
+
+<file path=ppt/slides/slide13.xml><?xml version="1.0" encoding="utf-8"?>
+<p:sld xmlns:a="http://schemas.openxmlformats.org/drawingml/2006/main" xmlns:r="http://schemas.openxmlformats.org/officeDocument/2006/relationships" xmlns:p="http://schemas.openxmlformats.org/presentationml/2006/main">
+  <p:cSld>
+    <p:spTree>
+      <p:nvGrpSpPr>
+        <p:cNvPr id="1" name=""/>
+        <p:cNvGrpSpPr/>
+        <p:nvPr/>
+      </p:nvGrpSpPr>
+      <p:grpSpPr>
+        <a:xfrm>
+          <a:off x="0" y="0"/>
+          <a:ext cx="0" cy="0"/>
+          <a:chOff x="0" y="0"/>
+          <a:chExt cx="0" cy="0"/>
+        </a:xfrm>
+      </p:grpSpPr>
+      <p:pic>
+        <p:nvPicPr>
+          <p:cNvPr id="3078" name="Picture 6"/>
+          <p:cNvPicPr>
+            <a:picLocks noChangeAspect="1" noChangeArrowheads="1"/>
+          </p:cNvPicPr>
+          <p:nvPr/>
+        </p:nvPicPr>
+        <p:blipFill>
+          <a:blip r:embed="rId2">
+            <a:extLst>
+              <a:ext uri="{28A0092B-C50C-407E-A947-70E740481C1C}">
+                <a14:useLocalDpi xmlns:a14="http://schemas.microsoft.com/office/drawing/2010/main" val="0"/>
+              </a:ext>
+            </a:extLst>
+          </a:blip>
+          <a:stretch>
+            <a:fillRect/>
+          </a:stretch>
+        </p:blipFill>
+        <p:spPr bwMode="auto">
+          <a:xfrm>
+            <a:off x="0" y="-1702853"/>
+            <a:ext cx="12337960" cy="6928624"/>
+          </a:xfrm>
+          <a:prstGeom prst="rect">
+            <a:avLst/>
+          </a:prstGeom>
+          <a:noFill/>
+          <a:extLst>
+            <a:ext uri="{909E8E84-426E-40DD-AFC4-6F175D3DCCD1}">
+              <a14:hiddenFill xmlns:a14="http://schemas.microsoft.com/office/drawing/2010/main">
+                <a:solidFill>
+                  <a:srgbClr val="FFFFFF"/>
+                </a:solidFill>
+              </a14:hiddenFill>
+            </a:ext>
+          </a:extLst>
+        </p:spPr>
+      </p:pic>
+      <p:sp>
+        <p:nvSpPr>
+          <p:cNvPr id="5" name="Retângulo 4"/>
+          <p:cNvSpPr/>
+          <p:nvPr/>
+        </p:nvSpPr>
+        <p:spPr>
+          <a:xfrm>
+            <a:off x="1" y="-1710531"/>
+            <a:ext cx="12337960" cy="6942042"/>
+          </a:xfrm>
+          <a:prstGeom prst="rect">
+            <a:avLst/>
+          </a:prstGeom>
+          <a:gradFill flip="none" rotWithShape="1">
+            <a:gsLst>
+              <a:gs pos="100000">
+                <a:srgbClr val="003300"/>
+              </a:gs>
+              <a:gs pos="0">
+                <a:srgbClr val="003300"/>
+              </a:gs>
+              <a:gs pos="54000">
+                <a:srgbClr val="003300">
+                  <a:alpha val="90000"/>
+                </a:srgbClr>
+              </a:gs>
+            </a:gsLst>
+            <a:path path="rect">
+              <a:fillToRect l="100000" t="100000"/>
+            </a:path>
+            <a:tileRect r="-100000" b="-100000"/>
+          </a:gradFill>
+          <a:ln>
+            <a:noFill/>
+          </a:ln>
+        </p:spPr>
+        <p:style>
+          <a:lnRef idx="2">
+            <a:schemeClr val="accent1">
+              <a:shade val="50000"/>
+            </a:schemeClr>
+          </a:lnRef>
+          <a:fillRef idx="1">
+            <a:schemeClr val="accent1"/>
+          </a:fillRef>
+          <a:effectRef idx="0">
+            <a:schemeClr val="accent1"/>
+          </a:effectRef>
+          <a:fontRef idx="minor">
+            <a:schemeClr val="lt1"/>
+          </a:fontRef>
+        </p:style>
+        <p:txBody>
+          <a:bodyPr rtlCol="0" anchor="ctr"/>
+          <a:lstStyle/>
+          <a:p>
+            <a:pPr algn="ctr"/>
+            <a:endParaRPr lang="pt-BR"/>
+          </a:p>
+        </p:txBody>
+      </p:sp>
+      <p:sp>
+        <p:nvSpPr>
+          <p:cNvPr id="2" name="Retângulo 1"/>
+          <p:cNvSpPr/>
+          <p:nvPr/>
+        </p:nvSpPr>
+        <p:spPr>
+          <a:xfrm>
+            <a:off x="-1139685" y="-1036515"/>
+            <a:ext cx="914400" cy="914400"/>
+          </a:xfrm>
+          <a:prstGeom prst="rect">
+            <a:avLst/>
+          </a:prstGeom>
+          <a:solidFill>
+            <a:srgbClr val="008000"/>
+          </a:solidFill>
+        </p:spPr>
+        <p:style>
+          <a:lnRef idx="2">
+            <a:schemeClr val="accent1">
+              <a:shade val="50000"/>
+            </a:schemeClr>
+          </a:lnRef>
+          <a:fillRef idx="1">
+            <a:schemeClr val="accent1"/>
+          </a:fillRef>
+          <a:effectRef idx="0">
+            <a:schemeClr val="accent1"/>
+          </a:effectRef>
+          <a:fontRef idx="minor">
+            <a:schemeClr val="lt1"/>
+          </a:fontRef>
+        </p:style>
+        <p:txBody>
+          <a:bodyPr rtlCol="0" anchor="ctr"/>
+          <a:lstStyle/>
+          <a:p>
+            <a:pPr algn="ctr"/>
+            <a:endParaRPr lang="pt-BR"/>
+          </a:p>
+        </p:txBody>
+      </p:sp>
+      <p:sp>
+        <p:nvSpPr>
+          <p:cNvPr id="8" name="Retângulo 7"/>
+          <p:cNvSpPr/>
+          <p:nvPr/>
+        </p:nvSpPr>
+        <p:spPr>
+          <a:xfrm>
+            <a:off x="-1139685" y="282007"/>
+            <a:ext cx="914400" cy="914400"/>
+          </a:xfrm>
+          <a:prstGeom prst="rect">
+            <a:avLst/>
+          </a:prstGeom>
+          <a:solidFill>
+            <a:srgbClr val="003300"/>
+          </a:solidFill>
+        </p:spPr>
+        <p:style>
+          <a:lnRef idx="2">
+            <a:schemeClr val="accent1">
+              <a:shade val="50000"/>
+            </a:schemeClr>
+          </a:lnRef>
+          <a:fillRef idx="1">
+            <a:schemeClr val="accent1"/>
+          </a:fillRef>
+          <a:effectRef idx="0">
+            <a:schemeClr val="accent1"/>
+          </a:effectRef>
+          <a:fontRef idx="minor">
+            <a:schemeClr val="lt1"/>
+          </a:fontRef>
+        </p:style>
+        <p:txBody>
+          <a:bodyPr rtlCol="0" anchor="ctr"/>
+          <a:lstStyle/>
+          <a:p>
+            <a:pPr algn="ctr"/>
+            <a:endParaRPr lang="pt-BR"/>
+          </a:p>
+        </p:txBody>
+      </p:sp>
+      <p:sp>
+        <p:nvSpPr>
+          <p:cNvPr id="9" name="Retângulo 8"/>
+          <p:cNvSpPr/>
+          <p:nvPr/>
+        </p:nvSpPr>
+        <p:spPr>
+          <a:xfrm>
+            <a:off x="-1191201" y="1600529"/>
+            <a:ext cx="914400" cy="914400"/>
+          </a:xfrm>
+          <a:prstGeom prst="rect">
+            <a:avLst/>
+          </a:prstGeom>
+          <a:solidFill>
+            <a:srgbClr val="112814"/>
+          </a:solidFill>
+        </p:spPr>
+        <p:style>
+          <a:lnRef idx="2">
+            <a:schemeClr val="accent1">
+              <a:shade val="50000"/>
+            </a:schemeClr>
+          </a:lnRef>
+          <a:fillRef idx="1">
+            <a:schemeClr val="accent1"/>
+          </a:fillRef>
+          <a:effectRef idx="0">
+            <a:schemeClr val="accent1"/>
+          </a:effectRef>
+          <a:fontRef idx="minor">
+            <a:schemeClr val="lt1"/>
+          </a:fontRef>
+        </p:style>
+        <p:txBody>
+          <a:bodyPr rtlCol="0" anchor="ctr"/>
+          <a:lstStyle/>
+          <a:p>
+            <a:pPr algn="ctr"/>
+            <a:endParaRPr lang="pt-BR"/>
+          </a:p>
+        </p:txBody>
+      </p:sp>
+      <p:sp>
+        <p:nvSpPr>
+          <p:cNvPr id="10" name="Retângulo 9"/>
+          <p:cNvSpPr/>
+          <p:nvPr/>
+        </p:nvSpPr>
+        <p:spPr>
+          <a:xfrm>
+            <a:off x="-1139685" y="2849685"/>
+            <a:ext cx="914400" cy="914400"/>
+          </a:xfrm>
+          <a:prstGeom prst="rect">
+            <a:avLst/>
+          </a:prstGeom>
+          <a:solidFill>
+            <a:srgbClr val="B31110"/>
+          </a:solidFill>
+        </p:spPr>
+        <p:style>
+          <a:lnRef idx="2">
+            <a:schemeClr val="accent1">
+              <a:shade val="50000"/>
+            </a:schemeClr>
+          </a:lnRef>
+          <a:fillRef idx="1">
+            <a:schemeClr val="accent1"/>
+          </a:fillRef>
+          <a:effectRef idx="0">
+            <a:schemeClr val="accent1"/>
+          </a:effectRef>
+          <a:fontRef idx="minor">
+            <a:schemeClr val="lt1"/>
+          </a:fontRef>
+        </p:style>
+        <p:txBody>
+          <a:bodyPr rtlCol="0" anchor="ctr"/>
+          <a:lstStyle/>
+          <a:p>
+            <a:pPr algn="ctr"/>
+            <a:endParaRPr lang="pt-BR"/>
+          </a:p>
+        </p:txBody>
+      </p:sp>
+      <p:sp>
+        <p:nvSpPr>
+          <p:cNvPr id="4" name="AutoShape 4" descr="8K Minecraft Wallpapers - Wallpaper Cave"/>
+          <p:cNvSpPr>
+            <a:spLocks noChangeAspect="1" noChangeArrowheads="1"/>
+          </p:cNvSpPr>
+          <p:nvPr/>
+        </p:nvSpPr>
+        <p:spPr bwMode="auto">
+          <a:xfrm>
+            <a:off x="307975" y="-1666082"/>
+            <a:ext cx="304800" cy="304801"/>
+          </a:xfrm>
+          <a:prstGeom prst="rect">
+            <a:avLst/>
+          </a:prstGeom>
+          <a:noFill/>
+          <a:extLst>
+            <a:ext uri="{909E8E84-426E-40DD-AFC4-6F175D3DCCD1}">
+              <a14:hiddenFill xmlns:a14="http://schemas.microsoft.com/office/drawing/2010/main">
+                <a:solidFill>
+                  <a:srgbClr val="FFFFFF"/>
+                </a:solidFill>
+              </a14:hiddenFill>
+            </a:ext>
+          </a:extLst>
+        </p:spPr>
+        <p:txBody>
+          <a:bodyPr vert="horz" wrap="square" lIns="91440" tIns="45720" rIns="91440" bIns="45720" numCol="1" anchor="t" anchorCtr="0" compatLnSpc="1">
+            <a:prstTxWarp prst="textNoShape">
+              <a:avLst/>
+            </a:prstTxWarp>
+          </a:bodyPr>
+          <a:lstStyle/>
+          <a:p>
+            <a:endParaRPr lang="pt-BR"/>
+          </a:p>
+        </p:txBody>
+      </p:sp>
+    </p:spTree>
+    <p:extLst>
+      <p:ext uri="{BB962C8B-B14F-4D97-AF65-F5344CB8AC3E}">
+        <p14:creationId xmlns:p14="http://schemas.microsoft.com/office/powerpoint/2010/main" val="1941718719"/>
       </p:ext>
     </p:extLst>
   </p:cSld>
@@ -3572,7 +4629,7 @@
         </p:blipFill>
         <p:spPr>
           <a:xfrm>
-            <a:off x="0" y="0"/>
+            <a:off x="0" y="-1674019"/>
             <a:ext cx="12192000" cy="6858000"/>
           </a:xfrm>
           <a:prstGeom prst="rect">
@@ -3588,7 +4645,7 @@
         </p:nvSpPr>
         <p:spPr>
           <a:xfrm>
-            <a:off x="0" y="0"/>
+            <a:off x="0" y="-1674019"/>
             <a:ext cx="12192000" cy="6858000"/>
           </a:xfrm>
           <a:prstGeom prst="rect">
@@ -3705,7 +4762,7 @@
         </p:blipFill>
         <p:spPr>
           <a:xfrm>
-            <a:off x="0" y="0"/>
+            <a:off x="0" y="-1674019"/>
             <a:ext cx="12192000" cy="6858000"/>
           </a:xfrm>
           <a:prstGeom prst="rect">
@@ -3721,7 +4778,7 @@
         </p:nvSpPr>
         <p:spPr>
           <a:xfrm>
-            <a:off x="0" y="0"/>
+            <a:off x="0" y="-1674019"/>
             <a:ext cx="12192000" cy="6858000"/>
           </a:xfrm>
           <a:prstGeom prst="rect">
@@ -3782,7 +4839,7 @@
         </p:nvSpPr>
         <p:spPr>
           <a:xfrm>
-            <a:off x="798491" y="1300766"/>
+            <a:off x="798492" y="-373253"/>
             <a:ext cx="5129161" cy="1569660"/>
           </a:xfrm>
           <a:prstGeom prst="rect">
@@ -3797,7 +4854,7 @@
           <a:lstStyle/>
           <a:p>
             <a:r>
-              <a:rPr lang="pt-BR" sz="4800" b="1" dirty="0" smtClean="0">
+              <a:rPr lang="pt-BR" sz="4800" b="1" dirty="0">
                 <a:solidFill>
                   <a:schemeClr val="bg1"/>
                 </a:solidFill>
@@ -3807,7 +4864,7 @@
           </a:p>
           <a:p>
             <a:r>
-              <a:rPr lang="pt-BR" sz="4800" b="1" dirty="0" smtClean="0">
+              <a:rPr lang="pt-BR" sz="4800" b="1" dirty="0">
                 <a:solidFill>
                   <a:schemeClr val="bg1"/>
                 </a:solidFill>
@@ -3830,7 +4887,7 @@
         </p:nvSpPr>
         <p:spPr>
           <a:xfrm>
-            <a:off x="-1139685" y="637504"/>
+            <a:off x="-1139685" y="-1036515"/>
             <a:ext cx="914400" cy="914400"/>
           </a:xfrm>
           <a:prstGeom prst="rect">
@@ -3873,7 +4930,7 @@
         </p:nvSpPr>
         <p:spPr>
           <a:xfrm>
-            <a:off x="-1139685" y="1956026"/>
+            <a:off x="-1139685" y="282007"/>
             <a:ext cx="914400" cy="914400"/>
           </a:xfrm>
           <a:prstGeom prst="rect">
@@ -3916,7 +4973,7 @@
         </p:nvSpPr>
         <p:spPr>
           <a:xfrm>
-            <a:off x="-1191201" y="3274548"/>
+            <a:off x="-1191201" y="1600529"/>
             <a:ext cx="914400" cy="914400"/>
           </a:xfrm>
           <a:prstGeom prst="rect">
@@ -3959,7 +5016,7 @@
         </p:nvSpPr>
         <p:spPr>
           <a:xfrm>
-            <a:off x="-1139685" y="4523704"/>
+            <a:off x="-1139685" y="2849685"/>
             <a:ext cx="914400" cy="914400"/>
           </a:xfrm>
           <a:prstGeom prst="rect">
@@ -4016,7 +5073,7 @@
         </p:blipFill>
         <p:spPr>
           <a:xfrm>
-            <a:off x="6262502" y="713215"/>
+            <a:off x="6262502" y="-960804"/>
             <a:ext cx="4014838" cy="6284754"/>
           </a:xfrm>
           <a:prstGeom prst="rect">
@@ -4032,7 +5089,7 @@
         </p:nvSpPr>
         <p:spPr>
           <a:xfrm>
-            <a:off x="798491" y="3855592"/>
+            <a:off x="798491" y="2181574"/>
             <a:ext cx="2923504" cy="363923"/>
           </a:xfrm>
           <a:prstGeom prst="roundRect">
@@ -4126,7 +5183,7 @@
         </p:blipFill>
         <p:spPr>
           <a:xfrm>
-            <a:off x="0" y="0"/>
+            <a:off x="0" y="-1674019"/>
             <a:ext cx="12192000" cy="6858000"/>
           </a:xfrm>
           <a:prstGeom prst="rect">
@@ -4142,7 +5199,7 @@
         </p:nvSpPr>
         <p:spPr>
           <a:xfrm>
-            <a:off x="0" y="0"/>
+            <a:off x="1" y="-1674019"/>
             <a:ext cx="12191999" cy="6858000"/>
           </a:xfrm>
           <a:prstGeom prst="rect">
@@ -4203,7 +5260,7 @@
         </p:nvSpPr>
         <p:spPr>
           <a:xfrm>
-            <a:off x="-1139685" y="637504"/>
+            <a:off x="-1139685" y="-1036515"/>
             <a:ext cx="914400" cy="914400"/>
           </a:xfrm>
           <a:prstGeom prst="rect">
@@ -4246,7 +5303,7 @@
         </p:nvSpPr>
         <p:spPr>
           <a:xfrm>
-            <a:off x="-1139685" y="1956026"/>
+            <a:off x="-1139685" y="282007"/>
             <a:ext cx="914400" cy="914400"/>
           </a:xfrm>
           <a:prstGeom prst="rect">
@@ -4289,7 +5346,7 @@
         </p:nvSpPr>
         <p:spPr>
           <a:xfrm>
-            <a:off x="-1191201" y="3274548"/>
+            <a:off x="-1191201" y="1600529"/>
             <a:ext cx="914400" cy="914400"/>
           </a:xfrm>
           <a:prstGeom prst="rect">
@@ -4332,7 +5389,7 @@
         </p:nvSpPr>
         <p:spPr>
           <a:xfrm>
-            <a:off x="-1139685" y="4523704"/>
+            <a:off x="-1139685" y="2849685"/>
             <a:ext cx="914400" cy="914400"/>
           </a:xfrm>
           <a:prstGeom prst="rect">
@@ -4426,7 +5483,7 @@
         </p:blipFill>
         <p:spPr>
           <a:xfrm>
-            <a:off x="-10099" y="0"/>
+            <a:off x="-10099" y="-1674019"/>
             <a:ext cx="12212198" cy="6858000"/>
           </a:xfrm>
           <a:prstGeom prst="rect">
@@ -4442,7 +5499,7 @@
         </p:nvSpPr>
         <p:spPr>
           <a:xfrm>
-            <a:off x="0" y="0"/>
+            <a:off x="1" y="-1674019"/>
             <a:ext cx="12191999" cy="6858000"/>
           </a:xfrm>
           <a:prstGeom prst="rect">
@@ -4503,7 +5560,7 @@
         </p:nvSpPr>
         <p:spPr>
           <a:xfrm>
-            <a:off x="-1139685" y="637504"/>
+            <a:off x="-1139685" y="-1036515"/>
             <a:ext cx="914400" cy="914400"/>
           </a:xfrm>
           <a:prstGeom prst="rect">
@@ -4546,7 +5603,7 @@
         </p:nvSpPr>
         <p:spPr>
           <a:xfrm>
-            <a:off x="-1139685" y="1956026"/>
+            <a:off x="-1139685" y="282007"/>
             <a:ext cx="914400" cy="914400"/>
           </a:xfrm>
           <a:prstGeom prst="rect">
@@ -4589,7 +5646,7 @@
         </p:nvSpPr>
         <p:spPr>
           <a:xfrm>
-            <a:off x="-1191201" y="3274548"/>
+            <a:off x="-1191201" y="1600529"/>
             <a:ext cx="914400" cy="914400"/>
           </a:xfrm>
           <a:prstGeom prst="rect">
@@ -4632,7 +5689,7 @@
         </p:nvSpPr>
         <p:spPr>
           <a:xfrm>
-            <a:off x="-1139685" y="4523704"/>
+            <a:off x="-1139685" y="2849685"/>
             <a:ext cx="914400" cy="914400"/>
           </a:xfrm>
           <a:prstGeom prst="rect">
@@ -4726,7 +5783,7 @@
         </p:blipFill>
         <p:spPr>
           <a:xfrm>
-            <a:off x="-10099" y="0"/>
+            <a:off x="-10099" y="-1674019"/>
             <a:ext cx="12212198" cy="6858000"/>
           </a:xfrm>
           <a:prstGeom prst="rect">
@@ -4742,7 +5799,7 @@
         </p:nvSpPr>
         <p:spPr>
           <a:xfrm>
-            <a:off x="0" y="0"/>
+            <a:off x="1" y="-1674019"/>
             <a:ext cx="12191999" cy="6858000"/>
           </a:xfrm>
           <a:prstGeom prst="rect">
@@ -4803,7 +5860,7 @@
         </p:nvSpPr>
         <p:spPr>
           <a:xfrm>
-            <a:off x="-1139685" y="637504"/>
+            <a:off x="-1139685" y="-1036515"/>
             <a:ext cx="914400" cy="914400"/>
           </a:xfrm>
           <a:prstGeom prst="rect">
@@ -4846,7 +5903,7 @@
         </p:nvSpPr>
         <p:spPr>
           <a:xfrm>
-            <a:off x="-1139685" y="1956026"/>
+            <a:off x="-1139685" y="282007"/>
             <a:ext cx="914400" cy="914400"/>
           </a:xfrm>
           <a:prstGeom prst="rect">
@@ -4889,7 +5946,7 @@
         </p:nvSpPr>
         <p:spPr>
           <a:xfrm>
-            <a:off x="-1191201" y="3274548"/>
+            <a:off x="-1191201" y="1600529"/>
             <a:ext cx="914400" cy="914400"/>
           </a:xfrm>
           <a:prstGeom prst="rect">
@@ -4932,7 +5989,7 @@
         </p:nvSpPr>
         <p:spPr>
           <a:xfrm>
-            <a:off x="-1139685" y="4523704"/>
+            <a:off x="-1139685" y="2849685"/>
             <a:ext cx="914400" cy="914400"/>
           </a:xfrm>
           <a:prstGeom prst="rect">
@@ -5026,7 +6083,7 @@
         </p:blipFill>
         <p:spPr>
           <a:xfrm>
-            <a:off x="-10099" y="0"/>
+            <a:off x="-10099" y="-1674019"/>
             <a:ext cx="12212198" cy="6858000"/>
           </a:xfrm>
           <a:prstGeom prst="rect">
@@ -5056,7 +6113,7 @@
         </p:blipFill>
         <p:spPr>
           <a:xfrm>
-            <a:off x="0" y="0"/>
+            <a:off x="0" y="-1674019"/>
             <a:ext cx="12192000" cy="6858000"/>
           </a:xfrm>
           <a:prstGeom prst="rect">
@@ -5087,7 +6144,7 @@
         </p:blipFill>
         <p:spPr bwMode="auto">
           <a:xfrm>
-            <a:off x="0" y="0"/>
+            <a:off x="0" y="-1674019"/>
             <a:ext cx="12192000" cy="6858001"/>
           </a:xfrm>
           <a:prstGeom prst="rect">
@@ -5113,7 +6170,7 @@
         </p:nvSpPr>
         <p:spPr>
           <a:xfrm>
-            <a:off x="0" y="0"/>
+            <a:off x="1" y="-1674019"/>
             <a:ext cx="12191999" cy="6858000"/>
           </a:xfrm>
           <a:prstGeom prst="rect">
@@ -5174,7 +6231,7 @@
         </p:nvSpPr>
         <p:spPr>
           <a:xfrm>
-            <a:off x="-1139685" y="637504"/>
+            <a:off x="-1139685" y="-1036515"/>
             <a:ext cx="914400" cy="914400"/>
           </a:xfrm>
           <a:prstGeom prst="rect">
@@ -5217,7 +6274,7 @@
         </p:nvSpPr>
         <p:spPr>
           <a:xfrm>
-            <a:off x="-1139685" y="1956026"/>
+            <a:off x="-1139685" y="282007"/>
             <a:ext cx="914400" cy="914400"/>
           </a:xfrm>
           <a:prstGeom prst="rect">
@@ -5260,7 +6317,7 @@
         </p:nvSpPr>
         <p:spPr>
           <a:xfrm>
-            <a:off x="-1191201" y="3274548"/>
+            <a:off x="-1191201" y="1600529"/>
             <a:ext cx="914400" cy="914400"/>
           </a:xfrm>
           <a:prstGeom prst="rect">
@@ -5303,7 +6360,7 @@
         </p:nvSpPr>
         <p:spPr>
           <a:xfrm>
-            <a:off x="-1139685" y="4523704"/>
+            <a:off x="-1139685" y="2849685"/>
             <a:ext cx="914400" cy="914400"/>
           </a:xfrm>
           <a:prstGeom prst="rect">
@@ -5398,7 +6455,7 @@
         </p:blipFill>
         <p:spPr bwMode="auto">
           <a:xfrm>
-            <a:off x="-1" y="-1218"/>
+            <a:off x="-1" y="-1675237"/>
             <a:ext cx="12194165" cy="6859218"/>
           </a:xfrm>
           <a:prstGeom prst="rect">
@@ -5424,7 +6481,7 @@
         </p:nvSpPr>
         <p:spPr>
           <a:xfrm>
-            <a:off x="1" y="-36512"/>
+            <a:off x="1" y="-1710531"/>
             <a:ext cx="12192000" cy="6858000"/>
           </a:xfrm>
           <a:prstGeom prst="rect">
@@ -5485,7 +6542,7 @@
         </p:nvSpPr>
         <p:spPr>
           <a:xfrm>
-            <a:off x="-1139685" y="637504"/>
+            <a:off x="-1139685" y="-1036515"/>
             <a:ext cx="914400" cy="914400"/>
           </a:xfrm>
           <a:prstGeom prst="rect">
@@ -5528,7 +6585,7 @@
         </p:nvSpPr>
         <p:spPr>
           <a:xfrm>
-            <a:off x="-1139685" y="1956026"/>
+            <a:off x="-1139685" y="282007"/>
             <a:ext cx="914400" cy="914400"/>
           </a:xfrm>
           <a:prstGeom prst="rect">
@@ -5571,7 +6628,7 @@
         </p:nvSpPr>
         <p:spPr>
           <a:xfrm>
-            <a:off x="-1191201" y="3274548"/>
+            <a:off x="-1191201" y="1600529"/>
             <a:ext cx="914400" cy="914400"/>
           </a:xfrm>
           <a:prstGeom prst="rect">
@@ -5614,7 +6671,7 @@
         </p:nvSpPr>
         <p:spPr>
           <a:xfrm>
-            <a:off x="-1139685" y="4523704"/>
+            <a:off x="-1139685" y="2849685"/>
             <a:ext cx="914400" cy="914400"/>
           </a:xfrm>
           <a:prstGeom prst="rect">
@@ -5709,7 +6766,7 @@
         </p:blipFill>
         <p:spPr bwMode="auto">
           <a:xfrm>
-            <a:off x="0" y="-34573"/>
+            <a:off x="1" y="-2834395"/>
             <a:ext cx="12337961" cy="6940103"/>
           </a:xfrm>
           <a:prstGeom prst="rect">
@@ -5735,29 +6792,27 @@
         </p:nvSpPr>
         <p:spPr>
           <a:xfrm>
-            <a:off x="1" y="-36512"/>
-            <a:ext cx="12337960" cy="6942042"/>
+            <a:off x="1" y="-1708592"/>
+            <a:ext cx="12337960" cy="5472677"/>
           </a:xfrm>
           <a:prstGeom prst="rect">
             <a:avLst/>
           </a:prstGeom>
           <a:gradFill flip="none" rotWithShape="1">
             <a:gsLst>
-              <a:gs pos="0">
+              <a:gs pos="94000">
+                <a:srgbClr val="003300"/>
+              </a:gs>
+              <a:gs pos="42000">
                 <a:srgbClr val="003300">
-                  <a:alpha val="80000"/>
-                </a:srgbClr>
-              </a:gs>
-              <a:gs pos="100000">
-                <a:srgbClr val="003300">
-                  <a:alpha val="80000"/>
+                  <a:alpha val="90000"/>
                 </a:srgbClr>
               </a:gs>
             </a:gsLst>
-            <a:path path="circle">
-              <a:fillToRect l="100000" t="100000"/>
+            <a:path path="shape">
+              <a:fillToRect l="50000" t="50000" r="50000" b="50000"/>
             </a:path>
-            <a:tileRect r="-100000" b="-100000"/>
+            <a:tileRect/>
           </a:gradFill>
           <a:ln>
             <a:noFill/>
@@ -5796,7 +6851,7 @@
         </p:nvSpPr>
         <p:spPr>
           <a:xfrm>
-            <a:off x="-1139685" y="637504"/>
+            <a:off x="-1139685" y="-1036515"/>
             <a:ext cx="914400" cy="914400"/>
           </a:xfrm>
           <a:prstGeom prst="rect">
@@ -5839,7 +6894,7 @@
         </p:nvSpPr>
         <p:spPr>
           <a:xfrm>
-            <a:off x="-1139685" y="1956026"/>
+            <a:off x="-1139685" y="282007"/>
             <a:ext cx="914400" cy="914400"/>
           </a:xfrm>
           <a:prstGeom prst="rect">
@@ -5882,7 +6937,7 @@
         </p:nvSpPr>
         <p:spPr>
           <a:xfrm>
-            <a:off x="-1191201" y="3274548"/>
+            <a:off x="-1191201" y="1600529"/>
             <a:ext cx="914400" cy="914400"/>
           </a:xfrm>
           <a:prstGeom prst="rect">
@@ -5925,7 +6980,7 @@
         </p:nvSpPr>
         <p:spPr>
           <a:xfrm>
-            <a:off x="-1139685" y="4523704"/>
+            <a:off x="-1139685" y="2849685"/>
             <a:ext cx="914400" cy="914400"/>
           </a:xfrm>
           <a:prstGeom prst="rect">
@@ -5970,7 +7025,7 @@
         </p:nvSpPr>
         <p:spPr bwMode="auto">
           <a:xfrm>
-            <a:off x="307975" y="7937"/>
+            <a:off x="307975" y="-1666082"/>
             <a:ext cx="304800" cy="304801"/>
           </a:xfrm>
           <a:prstGeom prst="rect">
@@ -6022,7 +7077,7 @@
 <file path=ppt/theme/theme1.xml><?xml version="1.0" encoding="utf-8"?>
 <a:theme xmlns:a="http://schemas.openxmlformats.org/drawingml/2006/main" name="Tema do Office">
   <a:themeElements>
-    <a:clrScheme name="Escritório">
+    <a:clrScheme name="Tema do Office">
       <a:dk1>
         <a:sysClr val="windowText" lastClr="000000"/>
       </a:dk1>
@@ -6060,7 +7115,7 @@
         <a:srgbClr val="954F72"/>
       </a:folHlink>
     </a:clrScheme>
-    <a:fontScheme name="Escritório">
+    <a:fontScheme name="Tema do Office">
       <a:majorFont>
         <a:latin typeface="Calibri Light" panose="020F0302020204030204"/>
         <a:ea typeface=""/>
@@ -6132,7 +7187,7 @@
         <a:font script="Geor" typeface="Sylfaen"/>
       </a:minorFont>
     </a:fontScheme>
-    <a:fmtScheme name="Escritório">
+    <a:fmtScheme name="Tema do Office">
       <a:fillStyleLst>
         <a:solidFill>
           <a:schemeClr val="phClr"/>

</xml_diff>